<commit_message>
Change the ppt a little bit
</commit_message>
<xml_diff>
--- a/AllocatorProfiler.pptx
+++ b/AllocatorProfiler.pptx
@@ -299,7 +299,7 @@
           <a:p>
             <a:fld id="{05A3027E-D084-F247-87DF-149484797FF3}" type="datetimeFigureOut">
               <a:rPr lang="en-US" smtClean="0"/>
-              <a:t>6/30/18</a:t>
+              <a:t>8/23/18</a:t>
             </a:fld>
             <a:endParaRPr lang="en-US"/>
           </a:p>
@@ -469,7 +469,7 @@
           <a:p>
             <a:fld id="{05A3027E-D084-F247-87DF-149484797FF3}" type="datetimeFigureOut">
               <a:rPr lang="en-US" smtClean="0"/>
-              <a:t>6/30/18</a:t>
+              <a:t>8/23/18</a:t>
             </a:fld>
             <a:endParaRPr lang="en-US"/>
           </a:p>
@@ -649,7 +649,7 @@
           <a:p>
             <a:fld id="{05A3027E-D084-F247-87DF-149484797FF3}" type="datetimeFigureOut">
               <a:rPr lang="en-US" smtClean="0"/>
-              <a:t>6/30/18</a:t>
+              <a:t>8/23/18</a:t>
             </a:fld>
             <a:endParaRPr lang="en-US"/>
           </a:p>
@@ -819,7 +819,7 @@
           <a:p>
             <a:fld id="{05A3027E-D084-F247-87DF-149484797FF3}" type="datetimeFigureOut">
               <a:rPr lang="en-US" smtClean="0"/>
-              <a:t>6/30/18</a:t>
+              <a:t>8/23/18</a:t>
             </a:fld>
             <a:endParaRPr lang="en-US"/>
           </a:p>
@@ -1065,7 +1065,7 @@
           <a:p>
             <a:fld id="{05A3027E-D084-F247-87DF-149484797FF3}" type="datetimeFigureOut">
               <a:rPr lang="en-US" smtClean="0"/>
-              <a:t>6/30/18</a:t>
+              <a:t>8/23/18</a:t>
             </a:fld>
             <a:endParaRPr lang="en-US"/>
           </a:p>
@@ -1353,7 +1353,7 @@
           <a:p>
             <a:fld id="{05A3027E-D084-F247-87DF-149484797FF3}" type="datetimeFigureOut">
               <a:rPr lang="en-US" smtClean="0"/>
-              <a:t>6/30/18</a:t>
+              <a:t>8/23/18</a:t>
             </a:fld>
             <a:endParaRPr lang="en-US"/>
           </a:p>
@@ -1775,7 +1775,7 @@
           <a:p>
             <a:fld id="{05A3027E-D084-F247-87DF-149484797FF3}" type="datetimeFigureOut">
               <a:rPr lang="en-US" smtClean="0"/>
-              <a:t>6/30/18</a:t>
+              <a:t>8/23/18</a:t>
             </a:fld>
             <a:endParaRPr lang="en-US"/>
           </a:p>
@@ -1893,7 +1893,7 @@
           <a:p>
             <a:fld id="{05A3027E-D084-F247-87DF-149484797FF3}" type="datetimeFigureOut">
               <a:rPr lang="en-US" smtClean="0"/>
-              <a:t>6/30/18</a:t>
+              <a:t>8/23/18</a:t>
             </a:fld>
             <a:endParaRPr lang="en-US"/>
           </a:p>
@@ -1988,7 +1988,7 @@
           <a:p>
             <a:fld id="{05A3027E-D084-F247-87DF-149484797FF3}" type="datetimeFigureOut">
               <a:rPr lang="en-US" smtClean="0"/>
-              <a:t>6/30/18</a:t>
+              <a:t>8/23/18</a:t>
             </a:fld>
             <a:endParaRPr lang="en-US"/>
           </a:p>
@@ -2265,7 +2265,7 @@
           <a:p>
             <a:fld id="{05A3027E-D084-F247-87DF-149484797FF3}" type="datetimeFigureOut">
               <a:rPr lang="en-US" smtClean="0"/>
-              <a:t>6/30/18</a:t>
+              <a:t>8/23/18</a:t>
             </a:fld>
             <a:endParaRPr lang="en-US"/>
           </a:p>
@@ -2518,7 +2518,7 @@
           <a:p>
             <a:fld id="{05A3027E-D084-F247-87DF-149484797FF3}" type="datetimeFigureOut">
               <a:rPr lang="en-US" smtClean="0"/>
-              <a:t>6/30/18</a:t>
+              <a:t>8/23/18</a:t>
             </a:fld>
             <a:endParaRPr lang="en-US"/>
           </a:p>
@@ -2731,7 +2731,7 @@
           <a:p>
             <a:fld id="{05A3027E-D084-F247-87DF-149484797FF3}" type="datetimeFigureOut">
               <a:rPr lang="en-US" smtClean="0"/>
-              <a:t>6/30/18</a:t>
+              <a:t>8/23/18</a:t>
             </a:fld>
             <a:endParaRPr lang="en-US"/>
           </a:p>
@@ -3118,7 +3118,9 @@
         </p:nvSpPr>
         <p:spPr/>
         <p:txBody>
-          <a:bodyPr/>
+          <a:bodyPr>
+            <a:normAutofit fontScale="90000"/>
+          </a:bodyPr>
           <a:lstStyle/>
           <a:p>
             <a:r>
@@ -3135,7 +3137,7 @@
             </a:r>
             <a:r>
               <a:rPr lang="en-US" altLang="zh-CN" dirty="0" smtClean="0"/>
-              <a:t>Profiling</a:t>
+              <a:t>A General Profiler Profiling</a:t>
             </a:r>
             <a:r>
               <a:rPr lang="zh-CN" altLang="en-US" dirty="0" smtClean="0"/>
@@ -3143,7 +3145,7 @@
             </a:r>
             <a:r>
               <a:rPr lang="en-US" altLang="zh-CN" dirty="0" smtClean="0"/>
-              <a:t>the Memory</a:t>
+              <a:t>Memory</a:t>
             </a:r>
             <a:r>
               <a:rPr lang="zh-CN" altLang="en-US" dirty="0" smtClean="0"/>
@@ -3151,7 +3153,7 @@
             </a:r>
             <a:r>
               <a:rPr lang="en-US" altLang="zh-CN" dirty="0" smtClean="0"/>
-              <a:t>Allocator</a:t>
+              <a:t>Allocators</a:t>
             </a:r>
             <a:endParaRPr lang="en-US" dirty="0"/>
           </a:p>
@@ -3194,6 +3196,13 @@
   <p:clrMapOvr>
     <a:masterClrMapping/>
   </p:clrMapOvr>
+  <p:timing>
+    <p:tnLst>
+      <p:par>
+        <p:cTn xmlns:p14="http://schemas.microsoft.com/office/powerpoint/2010/main" id="1" dur="indefinite" restart="never" nodeType="tmRoot"/>
+      </p:par>
+    </p:tnLst>
+  </p:timing>
 </p:sld>
 </file>
 
@@ -3285,6 +3294,13 @@
   <p:clrMapOvr>
     <a:masterClrMapping/>
   </p:clrMapOvr>
+  <p:timing>
+    <p:tnLst>
+      <p:par>
+        <p:cTn xmlns:p14="http://schemas.microsoft.com/office/powerpoint/2010/main" id="1" dur="indefinite" restart="never" nodeType="tmRoot"/>
+      </p:par>
+    </p:tnLst>
+  </p:timing>
 </p:sld>
 </file>
 
@@ -3364,6 +3380,14 @@
               <a:rPr lang="en-US" dirty="0" err="1" smtClean="0"/>
               <a:t>TCMalloc</a:t>
             </a:r>
+            <a:r>
+              <a:rPr lang="en-US" dirty="0"/>
+              <a:t> </a:t>
+            </a:r>
+            <a:r>
+              <a:rPr lang="en-US" dirty="0" smtClean="0"/>
+              <a:t>(Google)</a:t>
+            </a:r>
             <a:endParaRPr lang="en-US" dirty="0" smtClean="0"/>
           </a:p>
           <a:p>
@@ -3374,8 +3398,9 @@
             </a:r>
             <a:r>
               <a:rPr lang="en-US" dirty="0" smtClean="0"/>
-              <a:t>/Hoard</a:t>
-            </a:r>
+              <a:t> (Facebook) /Hoard (Emery)</a:t>
+            </a:r>
+            <a:endParaRPr lang="en-US" dirty="0" smtClean="0"/>
           </a:p>
           <a:p>
             <a:r>
@@ -3389,6 +3414,10 @@
               <a:rPr lang="en-US" dirty="0" err="1" smtClean="0"/>
               <a:t>DieHarder</a:t>
             </a:r>
+            <a:r>
+              <a:rPr lang="en-US" dirty="0" smtClean="0"/>
+              <a:t> (Emery)</a:t>
+            </a:r>
             <a:endParaRPr lang="en-US" dirty="0" smtClean="0"/>
           </a:p>
           <a:p>
@@ -3397,13 +3426,25 @@
               <a:rPr lang="en-US" dirty="0" err="1" smtClean="0"/>
               <a:t>OpenBSD</a:t>
             </a:r>
+            <a:r>
+              <a:rPr lang="en-US" dirty="0" smtClean="0"/>
+              <a:t> </a:t>
+            </a:r>
             <a:endParaRPr lang="en-US" dirty="0" smtClean="0"/>
           </a:p>
           <a:p>
             <a:pPr lvl="1"/>
             <a:r>
               <a:rPr lang="en-US" dirty="0" smtClean="0"/>
-              <a:t>Guarder</a:t>
+              <a:t>Guarder </a:t>
+            </a:r>
+            <a:r>
+              <a:rPr lang="en-US" smtClean="0"/>
+              <a:t>(</a:t>
+            </a:r>
+            <a:r>
+              <a:rPr lang="en-US" smtClean="0"/>
+              <a:t>our)</a:t>
             </a:r>
             <a:endParaRPr lang="en-US" dirty="0"/>
           </a:p>
@@ -3449,6 +3490,13 @@
   <p:clrMapOvr>
     <a:masterClrMapping/>
   </p:clrMapOvr>
+  <p:timing>
+    <p:tnLst>
+      <p:par>
+        <p:cTn xmlns:p14="http://schemas.microsoft.com/office/powerpoint/2010/main" id="1" dur="indefinite" restart="never" nodeType="tmRoot"/>
+      </p:par>
+    </p:tnLst>
+  </p:timing>
 </p:sld>
 </file>
 
@@ -3539,6 +3587,13 @@
   <p:clrMapOvr>
     <a:masterClrMapping/>
   </p:clrMapOvr>
+  <p:timing>
+    <p:tnLst>
+      <p:par>
+        <p:cTn xmlns:p14="http://schemas.microsoft.com/office/powerpoint/2010/main" id="1" dur="indefinite" restart="never" nodeType="tmRoot"/>
+      </p:par>
+    </p:tnLst>
+  </p:timing>
 </p:sld>
 </file>
 
@@ -3651,6 +3706,13 @@
   <p:clrMapOvr>
     <a:masterClrMapping/>
   </p:clrMapOvr>
+  <p:timing>
+    <p:tnLst>
+      <p:par>
+        <p:cTn xmlns:p14="http://schemas.microsoft.com/office/powerpoint/2010/main" id="1" dur="indefinite" restart="never" nodeType="tmRoot"/>
+      </p:par>
+    </p:tnLst>
+  </p:timing>
 </p:sld>
 </file>
 
@@ -3758,7 +3820,7 @@
             <a:pPr lvl="1"/>
             <a:r>
               <a:rPr lang="en-US" dirty="0" smtClean="0"/>
-              <a:t>Page faults: PMU</a:t>
+              <a:t>TLB misses: PMU</a:t>
             </a:r>
           </a:p>
           <a:p>
@@ -3863,6 +3925,13 @@
   <p:clrMapOvr>
     <a:masterClrMapping/>
   </p:clrMapOvr>
+  <p:timing>
+    <p:tnLst>
+      <p:par>
+        <p:cTn xmlns:p14="http://schemas.microsoft.com/office/powerpoint/2010/main" id="1" dur="indefinite" restart="never" nodeType="tmRoot"/>
+      </p:par>
+    </p:tnLst>
+  </p:timing>
 </p:sld>
 </file>
 
@@ -4022,6 +4091,13 @@
   <p:clrMapOvr>
     <a:masterClrMapping/>
   </p:clrMapOvr>
+  <p:timing>
+    <p:tnLst>
+      <p:par>
+        <p:cTn xmlns:p14="http://schemas.microsoft.com/office/powerpoint/2010/main" id="1" dur="indefinite" restart="never" nodeType="tmRoot"/>
+      </p:par>
+    </p:tnLst>
+  </p:timing>
 </p:sld>
 </file>
 
@@ -4166,6 +4242,13 @@
   <p:clrMapOvr>
     <a:masterClrMapping/>
   </p:clrMapOvr>
+  <p:timing>
+    <p:tnLst>
+      <p:par>
+        <p:cTn xmlns:p14="http://schemas.microsoft.com/office/powerpoint/2010/main" id="1" dur="indefinite" restart="never" nodeType="tmRoot"/>
+      </p:par>
+    </p:tnLst>
+  </p:timing>
 </p:sld>
 </file>
 
@@ -4248,6 +4331,13 @@
   <p:clrMapOvr>
     <a:masterClrMapping/>
   </p:clrMapOvr>
+  <p:timing>
+    <p:tnLst>
+      <p:par>
+        <p:cTn xmlns:p14="http://schemas.microsoft.com/office/powerpoint/2010/main" id="1" dur="indefinite" restart="never" nodeType="tmRoot"/>
+      </p:par>
+    </p:tnLst>
+  </p:timing>
 </p:sld>
 </file>
 
@@ -4304,7 +4394,7 @@
         <p:spPr/>
         <p:txBody>
           <a:bodyPr>
-            <a:normAutofit fontScale="85000" lnSpcReduction="20000"/>
+            <a:normAutofit fontScale="77500" lnSpcReduction="20000"/>
           </a:bodyPr>
           <a:lstStyle/>
           <a:p>
@@ -4378,8 +4468,52 @@
           <a:p>
             <a:r>
               <a:rPr lang="en-US" dirty="0"/>
-              <a:t>Kernel space contention</a:t>
-            </a:r>
+              <a:t>Kernel space </a:t>
+            </a:r>
+            <a:r>
+              <a:rPr lang="en-US" dirty="0" smtClean="0"/>
+              <a:t>contention</a:t>
+            </a:r>
+          </a:p>
+          <a:p>
+            <a:pPr lvl="1"/>
+            <a:r>
+              <a:rPr lang="en-US" dirty="0" smtClean="0"/>
+              <a:t>How many times for each system call, such as </a:t>
+            </a:r>
+            <a:r>
+              <a:rPr lang="en-US" dirty="0" err="1" smtClean="0"/>
+              <a:t>mmap</a:t>
+            </a:r>
+            <a:r>
+              <a:rPr lang="en-US" dirty="0" smtClean="0"/>
+              <a:t>, </a:t>
+            </a:r>
+            <a:r>
+              <a:rPr lang="en-US" dirty="0" err="1" smtClean="0"/>
+              <a:t>munmap</a:t>
+            </a:r>
+            <a:r>
+              <a:rPr lang="en-US" dirty="0" smtClean="0"/>
+              <a:t>, </a:t>
+            </a:r>
+            <a:r>
+              <a:rPr lang="en-US" dirty="0" err="1" smtClean="0"/>
+              <a:t>madvise</a:t>
+            </a:r>
+            <a:r>
+              <a:rPr lang="en-US" dirty="0" smtClean="0"/>
+              <a:t>, </a:t>
+            </a:r>
+            <a:r>
+              <a:rPr lang="en-US" dirty="0" err="1" smtClean="0"/>
+              <a:t>brk</a:t>
+            </a:r>
+            <a:r>
+              <a:rPr lang="en-US" dirty="0"/>
+              <a:t>?</a:t>
+            </a:r>
+            <a:endParaRPr lang="en-US" dirty="0"/>
           </a:p>
           <a:p>
             <a:pPr lvl="1"/>
@@ -4439,6 +4573,13 @@
   <p:clrMapOvr>
     <a:masterClrMapping/>
   </p:clrMapOvr>
+  <p:timing>
+    <p:tnLst>
+      <p:par>
+        <p:cTn xmlns:p14="http://schemas.microsoft.com/office/powerpoint/2010/main" id="1" dur="indefinite" restart="never" nodeType="tmRoot"/>
+      </p:par>
+    </p:tnLst>
+  </p:timing>
 </p:sld>
 </file>
 
@@ -4492,9 +4633,16 @@
             <p:ph idx="1"/>
           </p:nvPr>
         </p:nvSpPr>
-        <p:spPr/>
-        <p:txBody>
-          <a:bodyPr/>
+        <p:spPr>
+          <a:xfrm>
+            <a:off x="457200" y="1417638"/>
+            <a:ext cx="8229600" cy="4525963"/>
+          </a:xfrm>
+        </p:spPr>
+        <p:txBody>
+          <a:bodyPr>
+            <a:normAutofit fontScale="85000" lnSpcReduction="20000"/>
+          </a:bodyPr>
           <a:lstStyle/>
           <a:p>
             <a:r>
@@ -4544,11 +4692,35 @@
             <a:pPr lvl="1"/>
             <a:r>
               <a:rPr lang="en-US" dirty="0"/>
-              <a:t>Interconnect Contention</a:t>
-            </a:r>
-          </a:p>
-          <a:p>
-            <a:pPr lvl="1"/>
+              <a:t>Interconnect </a:t>
+            </a:r>
+            <a:r>
+              <a:rPr lang="en-US" dirty="0" smtClean="0"/>
+              <a:t>Contention</a:t>
+            </a:r>
+          </a:p>
+          <a:p>
+            <a:pPr marL="57150" indent="0">
+              <a:buNone/>
+            </a:pPr>
+            <a:endParaRPr lang="en-US" dirty="0" smtClean="0"/>
+          </a:p>
+          <a:p>
+            <a:pPr marL="514350" indent="-457200"/>
+            <a:r>
+              <a:rPr lang="en-US" dirty="0" smtClean="0"/>
+              <a:t>TLB Friendliness</a:t>
+            </a:r>
+          </a:p>
+          <a:p>
+            <a:pPr marL="514350" indent="-457200"/>
+            <a:endParaRPr lang="en-US" dirty="0"/>
+          </a:p>
+          <a:p>
+            <a:r>
+              <a:rPr lang="en-US" dirty="0" smtClean="0"/>
+              <a:t>Page friendliness</a:t>
+            </a:r>
             <a:endParaRPr lang="en-US" dirty="0"/>
           </a:p>
         </p:txBody>
@@ -4563,6 +4735,13 @@
   <p:clrMapOvr>
     <a:masterClrMapping/>
   </p:clrMapOvr>
+  <p:timing>
+    <p:tnLst>
+      <p:par>
+        <p:cTn xmlns:p14="http://schemas.microsoft.com/office/powerpoint/2010/main" id="1" dur="indefinite" restart="never" nodeType="tmRoot"/>
+      </p:par>
+    </p:tnLst>
+  </p:timing>
 </p:sld>
 </file>
 
@@ -4680,6 +4859,13 @@
   <p:clrMapOvr>
     <a:masterClrMapping/>
   </p:clrMapOvr>
+  <p:timing>
+    <p:tnLst>
+      <p:par>
+        <p:cTn xmlns:p14="http://schemas.microsoft.com/office/powerpoint/2010/main" id="1" dur="indefinite" restart="never" nodeType="tmRoot"/>
+      </p:par>
+    </p:tnLst>
+  </p:timing>
 </p:sld>
 </file>
 

</xml_diff>

<commit_message>
Working on the intro
</commit_message>
<xml_diff>
--- a/AllocatorProfiler.pptx
+++ b/AllocatorProfiler.pptx
@@ -19,7 +19,10 @@
     <p:sldId id="272" r:id="rId13"/>
     <p:sldId id="274" r:id="rId14"/>
     <p:sldId id="266" r:id="rId15"/>
-    <p:sldId id="265" r:id="rId16"/>
+    <p:sldId id="275" r:id="rId16"/>
+    <p:sldId id="277" r:id="rId17"/>
+    <p:sldId id="276" r:id="rId18"/>
+    <p:sldId id="265" r:id="rId19"/>
   </p:sldIdLst>
   <p:sldSz cx="9144000" cy="6858000" type="screen4x3"/>
   <p:notesSz cx="6858000" cy="9144000"/>
@@ -118,6 +121,22 @@
       </a:defRPr>
     </a:lvl9pPr>
   </p:defaultTextStyle>
+  <p:extLst>
+    <p:ext uri="{EFAFB233-063F-42B5-8137-9DF3F51BA10A}">
+      <p15:sldGuideLst xmlns:p15="http://schemas.microsoft.com/office/powerpoint/2012/main">
+        <p15:guide id="1" orient="horz" pos="2160">
+          <p15:clr>
+            <a:srgbClr val="A4A3A4"/>
+          </p15:clr>
+        </p15:guide>
+        <p15:guide id="2" pos="2880">
+          <p15:clr>
+            <a:srgbClr val="A4A3A4"/>
+          </p15:clr>
+        </p15:guide>
+      </p15:sldGuideLst>
+    </p:ext>
+  </p:extLst>
 </p:presentation>
 </file>
 
@@ -159,10 +178,9 @@
           <a:lstStyle/>
           <a:p>
             <a:r>
-              <a:rPr lang="en-US" smtClean="0"/>
+              <a:rPr lang="en-US"/>
               <a:t>Click to edit Master title style</a:t>
             </a:r>
-            <a:endParaRPr lang="en-US"/>
           </a:p>
         </p:txBody>
       </p:sp>
@@ -278,10 +296,9 @@
           </a:lstStyle>
           <a:p>
             <a:r>
-              <a:rPr lang="en-US" smtClean="0"/>
+              <a:rPr lang="en-US"/>
               <a:t>Click to edit Master subtitle style</a:t>
             </a:r>
-            <a:endParaRPr lang="en-US"/>
           </a:p>
         </p:txBody>
       </p:sp>
@@ -302,7 +319,7 @@
           <a:p>
             <a:fld id="{05A3027E-D084-F247-87DF-149484797FF3}" type="datetimeFigureOut">
               <a:rPr lang="en-US" smtClean="0"/>
-              <a:t>8/23/18</a:t>
+              <a:t>7/24/19</a:t>
             </a:fld>
             <a:endParaRPr lang="en-US"/>
           </a:p>
@@ -396,10 +413,9 @@
           <a:lstStyle/>
           <a:p>
             <a:r>
-              <a:rPr lang="en-US" smtClean="0"/>
+              <a:rPr lang="en-US"/>
               <a:t>Click to edit Master title style</a:t>
             </a:r>
-            <a:endParaRPr lang="en-US"/>
           </a:p>
         </p:txBody>
       </p:sp>
@@ -420,38 +436,37 @@
           <a:p>
             <a:pPr lvl="0"/>
             <a:r>
-              <a:rPr lang="en-US" smtClean="0"/>
+              <a:rPr lang="en-US"/>
               <a:t>Click to edit Master text styles</a:t>
             </a:r>
           </a:p>
           <a:p>
             <a:pPr lvl="1"/>
             <a:r>
-              <a:rPr lang="en-US" smtClean="0"/>
+              <a:rPr lang="en-US"/>
               <a:t>Second level</a:t>
             </a:r>
           </a:p>
           <a:p>
             <a:pPr lvl="2"/>
             <a:r>
-              <a:rPr lang="en-US" smtClean="0"/>
+              <a:rPr lang="en-US"/>
               <a:t>Third level</a:t>
             </a:r>
           </a:p>
           <a:p>
             <a:pPr lvl="3"/>
             <a:r>
-              <a:rPr lang="en-US" smtClean="0"/>
+              <a:rPr lang="en-US"/>
               <a:t>Fourth level</a:t>
             </a:r>
           </a:p>
           <a:p>
             <a:pPr lvl="4"/>
             <a:r>
-              <a:rPr lang="en-US" smtClean="0"/>
+              <a:rPr lang="en-US"/>
               <a:t>Fifth level</a:t>
             </a:r>
-            <a:endParaRPr lang="en-US"/>
           </a:p>
         </p:txBody>
       </p:sp>
@@ -472,7 +487,7 @@
           <a:p>
             <a:fld id="{05A3027E-D084-F247-87DF-149484797FF3}" type="datetimeFigureOut">
               <a:rPr lang="en-US" smtClean="0"/>
-              <a:t>8/23/18</a:t>
+              <a:t>7/24/19</a:t>
             </a:fld>
             <a:endParaRPr lang="en-US"/>
           </a:p>
@@ -571,10 +586,9 @@
           <a:lstStyle/>
           <a:p>
             <a:r>
-              <a:rPr lang="en-US" smtClean="0"/>
+              <a:rPr lang="en-US"/>
               <a:t>Click to edit Master title style</a:t>
             </a:r>
-            <a:endParaRPr lang="en-US"/>
           </a:p>
         </p:txBody>
       </p:sp>
@@ -600,38 +614,37 @@
           <a:p>
             <a:pPr lvl="0"/>
             <a:r>
-              <a:rPr lang="en-US" smtClean="0"/>
+              <a:rPr lang="en-US"/>
               <a:t>Click to edit Master text styles</a:t>
             </a:r>
           </a:p>
           <a:p>
             <a:pPr lvl="1"/>
             <a:r>
-              <a:rPr lang="en-US" smtClean="0"/>
+              <a:rPr lang="en-US"/>
               <a:t>Second level</a:t>
             </a:r>
           </a:p>
           <a:p>
             <a:pPr lvl="2"/>
             <a:r>
-              <a:rPr lang="en-US" smtClean="0"/>
+              <a:rPr lang="en-US"/>
               <a:t>Third level</a:t>
             </a:r>
           </a:p>
           <a:p>
             <a:pPr lvl="3"/>
             <a:r>
-              <a:rPr lang="en-US" smtClean="0"/>
+              <a:rPr lang="en-US"/>
               <a:t>Fourth level</a:t>
             </a:r>
           </a:p>
           <a:p>
             <a:pPr lvl="4"/>
             <a:r>
-              <a:rPr lang="en-US" smtClean="0"/>
+              <a:rPr lang="en-US"/>
               <a:t>Fifth level</a:t>
             </a:r>
-            <a:endParaRPr lang="en-US"/>
           </a:p>
         </p:txBody>
       </p:sp>
@@ -652,7 +665,7 @@
           <a:p>
             <a:fld id="{05A3027E-D084-F247-87DF-149484797FF3}" type="datetimeFigureOut">
               <a:rPr lang="en-US" smtClean="0"/>
-              <a:t>8/23/18</a:t>
+              <a:t>7/24/19</a:t>
             </a:fld>
             <a:endParaRPr lang="en-US"/>
           </a:p>
@@ -746,10 +759,9 @@
           <a:lstStyle/>
           <a:p>
             <a:r>
-              <a:rPr lang="en-US" smtClean="0"/>
+              <a:rPr lang="en-US"/>
               <a:t>Click to edit Master title style</a:t>
             </a:r>
-            <a:endParaRPr lang="en-US"/>
           </a:p>
         </p:txBody>
       </p:sp>
@@ -770,38 +782,37 @@
           <a:p>
             <a:pPr lvl="0"/>
             <a:r>
-              <a:rPr lang="en-US" smtClean="0"/>
+              <a:rPr lang="en-US"/>
               <a:t>Click to edit Master text styles</a:t>
             </a:r>
           </a:p>
           <a:p>
             <a:pPr lvl="1"/>
             <a:r>
-              <a:rPr lang="en-US" smtClean="0"/>
+              <a:rPr lang="en-US"/>
               <a:t>Second level</a:t>
             </a:r>
           </a:p>
           <a:p>
             <a:pPr lvl="2"/>
             <a:r>
-              <a:rPr lang="en-US" smtClean="0"/>
+              <a:rPr lang="en-US"/>
               <a:t>Third level</a:t>
             </a:r>
           </a:p>
           <a:p>
             <a:pPr lvl="3"/>
             <a:r>
-              <a:rPr lang="en-US" smtClean="0"/>
+              <a:rPr lang="en-US"/>
               <a:t>Fourth level</a:t>
             </a:r>
           </a:p>
           <a:p>
             <a:pPr lvl="4"/>
             <a:r>
-              <a:rPr lang="en-US" smtClean="0"/>
+              <a:rPr lang="en-US"/>
               <a:t>Fifth level</a:t>
             </a:r>
-            <a:endParaRPr lang="en-US"/>
           </a:p>
         </p:txBody>
       </p:sp>
@@ -822,7 +833,7 @@
           <a:p>
             <a:fld id="{05A3027E-D084-F247-87DF-149484797FF3}" type="datetimeFigureOut">
               <a:rPr lang="en-US" smtClean="0"/>
-              <a:t>8/23/18</a:t>
+              <a:t>7/24/19</a:t>
             </a:fld>
             <a:endParaRPr lang="en-US"/>
           </a:p>
@@ -925,10 +936,9 @@
           </a:lstStyle>
           <a:p>
             <a:r>
-              <a:rPr lang="en-US" smtClean="0"/>
+              <a:rPr lang="en-US"/>
               <a:t>Click to edit Master title style</a:t>
             </a:r>
-            <a:endParaRPr lang="en-US"/>
           </a:p>
         </p:txBody>
       </p:sp>
@@ -1045,7 +1055,7 @@
           <a:p>
             <a:pPr lvl="0"/>
             <a:r>
-              <a:rPr lang="en-US" smtClean="0"/>
+              <a:rPr lang="en-US"/>
               <a:t>Click to edit Master text styles</a:t>
             </a:r>
           </a:p>
@@ -1068,7 +1078,7 @@
           <a:p>
             <a:fld id="{05A3027E-D084-F247-87DF-149484797FF3}" type="datetimeFigureOut">
               <a:rPr lang="en-US" smtClean="0"/>
-              <a:t>8/23/18</a:t>
+              <a:t>7/24/19</a:t>
             </a:fld>
             <a:endParaRPr lang="en-US"/>
           </a:p>
@@ -1162,10 +1172,9 @@
           <a:lstStyle/>
           <a:p>
             <a:r>
-              <a:rPr lang="en-US" smtClean="0"/>
+              <a:rPr lang="en-US"/>
               <a:t>Click to edit Master title style</a:t>
             </a:r>
-            <a:endParaRPr lang="en-US"/>
           </a:p>
         </p:txBody>
       </p:sp>
@@ -1219,38 +1228,37 @@
           <a:p>
             <a:pPr lvl="0"/>
             <a:r>
-              <a:rPr lang="en-US" smtClean="0"/>
+              <a:rPr lang="en-US"/>
               <a:t>Click to edit Master text styles</a:t>
             </a:r>
           </a:p>
           <a:p>
             <a:pPr lvl="1"/>
             <a:r>
-              <a:rPr lang="en-US" smtClean="0"/>
+              <a:rPr lang="en-US"/>
               <a:t>Second level</a:t>
             </a:r>
           </a:p>
           <a:p>
             <a:pPr lvl="2"/>
             <a:r>
-              <a:rPr lang="en-US" smtClean="0"/>
+              <a:rPr lang="en-US"/>
               <a:t>Third level</a:t>
             </a:r>
           </a:p>
           <a:p>
             <a:pPr lvl="3"/>
             <a:r>
-              <a:rPr lang="en-US" smtClean="0"/>
+              <a:rPr lang="en-US"/>
               <a:t>Fourth level</a:t>
             </a:r>
           </a:p>
           <a:p>
             <a:pPr lvl="4"/>
             <a:r>
-              <a:rPr lang="en-US" smtClean="0"/>
+              <a:rPr lang="en-US"/>
               <a:t>Fifth level</a:t>
             </a:r>
-            <a:endParaRPr lang="en-US"/>
           </a:p>
         </p:txBody>
       </p:sp>
@@ -1304,38 +1312,37 @@
           <a:p>
             <a:pPr lvl="0"/>
             <a:r>
-              <a:rPr lang="en-US" smtClean="0"/>
+              <a:rPr lang="en-US"/>
               <a:t>Click to edit Master text styles</a:t>
             </a:r>
           </a:p>
           <a:p>
             <a:pPr lvl="1"/>
             <a:r>
-              <a:rPr lang="en-US" smtClean="0"/>
+              <a:rPr lang="en-US"/>
               <a:t>Second level</a:t>
             </a:r>
           </a:p>
           <a:p>
             <a:pPr lvl="2"/>
             <a:r>
-              <a:rPr lang="en-US" smtClean="0"/>
+              <a:rPr lang="en-US"/>
               <a:t>Third level</a:t>
             </a:r>
           </a:p>
           <a:p>
             <a:pPr lvl="3"/>
             <a:r>
-              <a:rPr lang="en-US" smtClean="0"/>
+              <a:rPr lang="en-US"/>
               <a:t>Fourth level</a:t>
             </a:r>
           </a:p>
           <a:p>
             <a:pPr lvl="4"/>
             <a:r>
-              <a:rPr lang="en-US" smtClean="0"/>
+              <a:rPr lang="en-US"/>
               <a:t>Fifth level</a:t>
             </a:r>
-            <a:endParaRPr lang="en-US"/>
           </a:p>
         </p:txBody>
       </p:sp>
@@ -1356,7 +1363,7 @@
           <a:p>
             <a:fld id="{05A3027E-D084-F247-87DF-149484797FF3}" type="datetimeFigureOut">
               <a:rPr lang="en-US" smtClean="0"/>
-              <a:t>8/23/18</a:t>
+              <a:t>7/24/19</a:t>
             </a:fld>
             <a:endParaRPr lang="en-US"/>
           </a:p>
@@ -1454,10 +1461,9 @@
           </a:lstStyle>
           <a:p>
             <a:r>
-              <a:rPr lang="en-US" smtClean="0"/>
+              <a:rPr lang="en-US"/>
               <a:t>Click to edit Master title style</a:t>
             </a:r>
-            <a:endParaRPr lang="en-US"/>
           </a:p>
         </p:txBody>
       </p:sp>
@@ -1520,7 +1526,7 @@
           <a:p>
             <a:pPr lvl="0"/>
             <a:r>
-              <a:rPr lang="en-US" smtClean="0"/>
+              <a:rPr lang="en-US"/>
               <a:t>Click to edit Master text styles</a:t>
             </a:r>
           </a:p>
@@ -1576,38 +1582,37 @@
           <a:p>
             <a:pPr lvl="0"/>
             <a:r>
-              <a:rPr lang="en-US" smtClean="0"/>
+              <a:rPr lang="en-US"/>
               <a:t>Click to edit Master text styles</a:t>
             </a:r>
           </a:p>
           <a:p>
             <a:pPr lvl="1"/>
             <a:r>
-              <a:rPr lang="en-US" smtClean="0"/>
+              <a:rPr lang="en-US"/>
               <a:t>Second level</a:t>
             </a:r>
           </a:p>
           <a:p>
             <a:pPr lvl="2"/>
             <a:r>
-              <a:rPr lang="en-US" smtClean="0"/>
+              <a:rPr lang="en-US"/>
               <a:t>Third level</a:t>
             </a:r>
           </a:p>
           <a:p>
             <a:pPr lvl="3"/>
             <a:r>
-              <a:rPr lang="en-US" smtClean="0"/>
+              <a:rPr lang="en-US"/>
               <a:t>Fourth level</a:t>
             </a:r>
           </a:p>
           <a:p>
             <a:pPr lvl="4"/>
             <a:r>
-              <a:rPr lang="en-US" smtClean="0"/>
+              <a:rPr lang="en-US"/>
               <a:t>Fifth level</a:t>
             </a:r>
-            <a:endParaRPr lang="en-US"/>
           </a:p>
         </p:txBody>
       </p:sp>
@@ -1670,7 +1675,7 @@
           <a:p>
             <a:pPr lvl="0"/>
             <a:r>
-              <a:rPr lang="en-US" smtClean="0"/>
+              <a:rPr lang="en-US"/>
               <a:t>Click to edit Master text styles</a:t>
             </a:r>
           </a:p>
@@ -1726,38 +1731,37 @@
           <a:p>
             <a:pPr lvl="0"/>
             <a:r>
-              <a:rPr lang="en-US" smtClean="0"/>
+              <a:rPr lang="en-US"/>
               <a:t>Click to edit Master text styles</a:t>
             </a:r>
           </a:p>
           <a:p>
             <a:pPr lvl="1"/>
             <a:r>
-              <a:rPr lang="en-US" smtClean="0"/>
+              <a:rPr lang="en-US"/>
               <a:t>Second level</a:t>
             </a:r>
           </a:p>
           <a:p>
             <a:pPr lvl="2"/>
             <a:r>
-              <a:rPr lang="en-US" smtClean="0"/>
+              <a:rPr lang="en-US"/>
               <a:t>Third level</a:t>
             </a:r>
           </a:p>
           <a:p>
             <a:pPr lvl="3"/>
             <a:r>
-              <a:rPr lang="en-US" smtClean="0"/>
+              <a:rPr lang="en-US"/>
               <a:t>Fourth level</a:t>
             </a:r>
           </a:p>
           <a:p>
             <a:pPr lvl="4"/>
             <a:r>
-              <a:rPr lang="en-US" smtClean="0"/>
+              <a:rPr lang="en-US"/>
               <a:t>Fifth level</a:t>
             </a:r>
-            <a:endParaRPr lang="en-US"/>
           </a:p>
         </p:txBody>
       </p:sp>
@@ -1778,7 +1782,7 @@
           <a:p>
             <a:fld id="{05A3027E-D084-F247-87DF-149484797FF3}" type="datetimeFigureOut">
               <a:rPr lang="en-US" smtClean="0"/>
-              <a:t>8/23/18</a:t>
+              <a:t>7/24/19</a:t>
             </a:fld>
             <a:endParaRPr lang="en-US"/>
           </a:p>
@@ -1872,10 +1876,9 @@
           <a:lstStyle/>
           <a:p>
             <a:r>
-              <a:rPr lang="en-US" smtClean="0"/>
+              <a:rPr lang="en-US"/>
               <a:t>Click to edit Master title style</a:t>
             </a:r>
-            <a:endParaRPr lang="en-US"/>
           </a:p>
         </p:txBody>
       </p:sp>
@@ -1896,7 +1899,7 @@
           <a:p>
             <a:fld id="{05A3027E-D084-F247-87DF-149484797FF3}" type="datetimeFigureOut">
               <a:rPr lang="en-US" smtClean="0"/>
-              <a:t>8/23/18</a:t>
+              <a:t>7/24/19</a:t>
             </a:fld>
             <a:endParaRPr lang="en-US"/>
           </a:p>
@@ -1991,7 +1994,7 @@
           <a:p>
             <a:fld id="{05A3027E-D084-F247-87DF-149484797FF3}" type="datetimeFigureOut">
               <a:rPr lang="en-US" smtClean="0"/>
-              <a:t>8/23/18</a:t>
+              <a:t>7/24/19</a:t>
             </a:fld>
             <a:endParaRPr lang="en-US"/>
           </a:p>
@@ -2094,10 +2097,9 @@
           </a:lstStyle>
           <a:p>
             <a:r>
-              <a:rPr lang="en-US" smtClean="0"/>
+              <a:rPr lang="en-US"/>
               <a:t>Click to edit Master title style</a:t>
             </a:r>
-            <a:endParaRPr lang="en-US"/>
           </a:p>
         </p:txBody>
       </p:sp>
@@ -2151,38 +2153,37 @@
           <a:p>
             <a:pPr lvl="0"/>
             <a:r>
-              <a:rPr lang="en-US" smtClean="0"/>
+              <a:rPr lang="en-US"/>
               <a:t>Click to edit Master text styles</a:t>
             </a:r>
           </a:p>
           <a:p>
             <a:pPr lvl="1"/>
             <a:r>
-              <a:rPr lang="en-US" smtClean="0"/>
+              <a:rPr lang="en-US"/>
               <a:t>Second level</a:t>
             </a:r>
           </a:p>
           <a:p>
             <a:pPr lvl="2"/>
             <a:r>
-              <a:rPr lang="en-US" smtClean="0"/>
+              <a:rPr lang="en-US"/>
               <a:t>Third level</a:t>
             </a:r>
           </a:p>
           <a:p>
             <a:pPr lvl="3"/>
             <a:r>
-              <a:rPr lang="en-US" smtClean="0"/>
+              <a:rPr lang="en-US"/>
               <a:t>Fourth level</a:t>
             </a:r>
           </a:p>
           <a:p>
             <a:pPr lvl="4"/>
             <a:r>
-              <a:rPr lang="en-US" smtClean="0"/>
+              <a:rPr lang="en-US"/>
               <a:t>Fifth level</a:t>
             </a:r>
-            <a:endParaRPr lang="en-US"/>
           </a:p>
         </p:txBody>
       </p:sp>
@@ -2245,7 +2246,7 @@
           <a:p>
             <a:pPr lvl="0"/>
             <a:r>
-              <a:rPr lang="en-US" smtClean="0"/>
+              <a:rPr lang="en-US"/>
               <a:t>Click to edit Master text styles</a:t>
             </a:r>
           </a:p>
@@ -2268,7 +2269,7 @@
           <a:p>
             <a:fld id="{05A3027E-D084-F247-87DF-149484797FF3}" type="datetimeFigureOut">
               <a:rPr lang="en-US" smtClean="0"/>
-              <a:t>8/23/18</a:t>
+              <a:t>7/24/19</a:t>
             </a:fld>
             <a:endParaRPr lang="en-US"/>
           </a:p>
@@ -2371,10 +2372,9 @@
           </a:lstStyle>
           <a:p>
             <a:r>
-              <a:rPr lang="en-US" smtClean="0"/>
+              <a:rPr lang="en-US"/>
               <a:t>Click to edit Master title style</a:t>
             </a:r>
-            <a:endParaRPr lang="en-US"/>
           </a:p>
         </p:txBody>
       </p:sp>
@@ -2498,7 +2498,7 @@
           <a:p>
             <a:pPr lvl="0"/>
             <a:r>
-              <a:rPr lang="en-US" smtClean="0"/>
+              <a:rPr lang="en-US"/>
               <a:t>Click to edit Master text styles</a:t>
             </a:r>
           </a:p>
@@ -2521,7 +2521,7 @@
           <a:p>
             <a:fld id="{05A3027E-D084-F247-87DF-149484797FF3}" type="datetimeFigureOut">
               <a:rPr lang="en-US" smtClean="0"/>
-              <a:t>8/23/18</a:t>
+              <a:t>7/24/19</a:t>
             </a:fld>
             <a:endParaRPr lang="en-US"/>
           </a:p>
@@ -2630,10 +2630,9 @@
           <a:lstStyle/>
           <a:p>
             <a:r>
-              <a:rPr lang="en-US" smtClean="0"/>
+              <a:rPr lang="en-US"/>
               <a:t>Click to edit Master title style</a:t>
             </a:r>
-            <a:endParaRPr lang="en-US"/>
           </a:p>
         </p:txBody>
       </p:sp>
@@ -2664,38 +2663,37 @@
           <a:p>
             <a:pPr lvl="0"/>
             <a:r>
-              <a:rPr lang="en-US" smtClean="0"/>
+              <a:rPr lang="en-US"/>
               <a:t>Click to edit Master text styles</a:t>
             </a:r>
           </a:p>
           <a:p>
             <a:pPr lvl="1"/>
             <a:r>
-              <a:rPr lang="en-US" smtClean="0"/>
+              <a:rPr lang="en-US"/>
               <a:t>Second level</a:t>
             </a:r>
           </a:p>
           <a:p>
             <a:pPr lvl="2"/>
             <a:r>
-              <a:rPr lang="en-US" smtClean="0"/>
+              <a:rPr lang="en-US"/>
               <a:t>Third level</a:t>
             </a:r>
           </a:p>
           <a:p>
             <a:pPr lvl="3"/>
             <a:r>
-              <a:rPr lang="en-US" smtClean="0"/>
+              <a:rPr lang="en-US"/>
               <a:t>Fourth level</a:t>
             </a:r>
           </a:p>
           <a:p>
             <a:pPr lvl="4"/>
             <a:r>
-              <a:rPr lang="en-US" smtClean="0"/>
+              <a:rPr lang="en-US"/>
               <a:t>Fifth level</a:t>
             </a:r>
-            <a:endParaRPr lang="en-US"/>
           </a:p>
         </p:txBody>
       </p:sp>
@@ -2734,7 +2732,7 @@
           <a:p>
             <a:fld id="{05A3027E-D084-F247-87DF-149484797FF3}" type="datetimeFigureOut">
               <a:rPr lang="en-US" smtClean="0"/>
-              <a:t>8/23/18</a:t>
+              <a:t>7/24/19</a:t>
             </a:fld>
             <a:endParaRPr lang="en-US"/>
           </a:p>
@@ -3127,35 +3125,35 @@
           <a:lstStyle/>
           <a:p>
             <a:r>
-              <a:rPr lang="en-US" dirty="0" err="1" smtClean="0"/>
+              <a:rPr lang="en-US" dirty="0" err="1"/>
               <a:t>AllocatorProfiler</a:t>
             </a:r>
             <a:r>
-              <a:rPr lang="en-US" altLang="zh-CN" dirty="0" smtClean="0"/>
+              <a:rPr lang="en-US" altLang="zh-CN" dirty="0"/>
               <a:t>:</a:t>
             </a:r>
             <a:r>
-              <a:rPr lang="zh-CN" altLang="en-US" dirty="0" smtClean="0"/>
+              <a:rPr lang="zh-CN" altLang="en-US" dirty="0"/>
               <a:t> </a:t>
             </a:r>
             <a:r>
-              <a:rPr lang="en-US" altLang="zh-CN" dirty="0" smtClean="0"/>
+              <a:rPr lang="en-US" altLang="zh-CN" dirty="0"/>
               <a:t>A General Profiler Profiling</a:t>
             </a:r>
             <a:r>
-              <a:rPr lang="zh-CN" altLang="en-US" dirty="0" smtClean="0"/>
+              <a:rPr lang="zh-CN" altLang="en-US" dirty="0"/>
               <a:t> </a:t>
             </a:r>
             <a:r>
-              <a:rPr lang="en-US" altLang="zh-CN" dirty="0" smtClean="0"/>
+              <a:rPr lang="en-US" altLang="zh-CN" dirty="0"/>
               <a:t>Memory</a:t>
             </a:r>
             <a:r>
-              <a:rPr lang="zh-CN" altLang="en-US" dirty="0" smtClean="0"/>
+              <a:rPr lang="zh-CN" altLang="en-US" dirty="0"/>
               <a:t> </a:t>
             </a:r>
             <a:r>
-              <a:rPr lang="en-US" altLang="zh-CN" dirty="0" smtClean="0"/>
+              <a:rPr lang="en-US" altLang="zh-CN" dirty="0"/>
               <a:t>Allocators</a:t>
             </a:r>
             <a:endParaRPr lang="en-US" dirty="0"/>
@@ -3178,11 +3176,11 @@
           <a:lstStyle/>
           <a:p>
             <a:r>
-              <a:rPr lang="en-US" dirty="0" smtClean="0"/>
+              <a:rPr lang="en-US" dirty="0"/>
               <a:t>Or </a:t>
             </a:r>
             <a:r>
-              <a:rPr lang="en-US" dirty="0" err="1" smtClean="0"/>
+              <a:rPr lang="en-US" dirty="0" err="1"/>
               <a:t>mmprof</a:t>
             </a:r>
             <a:endParaRPr lang="en-US" dirty="0"/>
@@ -3199,13 +3197,6 @@
   <p:clrMapOvr>
     <a:masterClrMapping/>
   </p:clrMapOvr>
-  <p:timing>
-    <p:tnLst>
-      <p:par>
-        <p:cTn xmlns:p14="http://schemas.microsoft.com/office/powerpoint/2010/main" id="1" dur="indefinite" restart="never" nodeType="tmRoot"/>
-      </p:par>
-    </p:tnLst>
-  </p:timing>
 </p:sld>
 </file>
 
@@ -3242,10 +3233,9 @@
           <a:lstStyle/>
           <a:p>
             <a:r>
-              <a:rPr lang="en-US" dirty="0" smtClean="0"/>
+              <a:rPr lang="en-US" dirty="0"/>
               <a:t>Cache Friendliness</a:t>
             </a:r>
-            <a:endParaRPr lang="en-US" dirty="0"/>
           </a:p>
         </p:txBody>
       </p:sp>
@@ -3267,44 +3257,26 @@
           <a:lstStyle/>
           <a:p>
             <a:r>
-              <a:rPr lang="en-US" dirty="0" smtClean="0"/>
-              <a:t>The ratio of cache fullness. For each access, we can compute </a:t>
-            </a:r>
-            <a:r>
-              <a:rPr lang="en-US" dirty="0" smtClean="0"/>
-              <a:t>its </a:t>
-            </a:r>
-            <a:r>
-              <a:rPr lang="en-US" dirty="0" smtClean="0"/>
-              <a:t>cache fullness rate. </a:t>
-            </a:r>
-            <a:r>
-              <a:rPr lang="en-US" dirty="0" smtClean="0"/>
-              <a:t>For instance, if 32 bytes are utilized in a cache line, then 50% is the cache fullness ratio. In the end, we could have a total cache fullness ratio. We don’t need to compute the number. We just need to sum up the number of bytes inside each cache line, and divided by the number of accesses * 64 bytes. </a:t>
-            </a:r>
-            <a:endParaRPr lang="en-US" dirty="0" smtClean="0"/>
-          </a:p>
-          <a:p>
-            <a:endParaRPr lang="en-US" dirty="0" smtClean="0"/>
-          </a:p>
-          <a:p>
-            <a:r>
-              <a:rPr lang="en-US" dirty="0" smtClean="0"/>
-              <a:t>Therefore, we will track the number of bytes that has been allocated in each cache line, which is similar to the structure of Predator. </a:t>
-            </a:r>
-            <a:r>
-              <a:rPr lang="en-US" dirty="0" smtClean="0"/>
-              <a:t>For each allocation, we will add the corresponding bytes. For each </a:t>
-            </a:r>
-            <a:r>
-              <a:rPr lang="en-US" dirty="0" err="1" smtClean="0"/>
+              <a:rPr lang="en-US" dirty="0"/>
+              <a:t>The ratio of cache fullness. For each access, we can compute its cache fullness rate. For instance, if 32 bytes are utilized in a cache line, then 50% is the cache fullness ratio. In the end, we could have a total cache fullness ratio. We don’t need to compute the number. We just need to sum up the number of bytes inside each cache line, and divided by the number of accesses * 64 bytes. </a:t>
+            </a:r>
+          </a:p>
+          <a:p>
+            <a:endParaRPr lang="en-US" dirty="0"/>
+          </a:p>
+          <a:p>
+            <a:r>
+              <a:rPr lang="en-US" dirty="0"/>
+              <a:t>Therefore, we will track the number of bytes that has been allocated in each cache line, which is similar to the structure of Predator. For each allocation, we will add the corresponding bytes. For each </a:t>
+            </a:r>
+            <a:r>
+              <a:rPr lang="en-US" dirty="0" err="1"/>
               <a:t>deallocation</a:t>
             </a:r>
             <a:r>
-              <a:rPr lang="en-US" dirty="0" smtClean="0"/>
+              <a:rPr lang="en-US" dirty="0"/>
               <a:t>, we will subtract such bytes of corresponding cache line. </a:t>
             </a:r>
-            <a:endParaRPr lang="en-US" dirty="0" smtClean="0"/>
           </a:p>
           <a:p>
             <a:endParaRPr lang="en-US" dirty="0"/>
@@ -3321,13 +3293,6 @@
   <p:clrMapOvr>
     <a:masterClrMapping/>
   </p:clrMapOvr>
-  <p:timing>
-    <p:tnLst>
-      <p:par>
-        <p:cTn xmlns:p14="http://schemas.microsoft.com/office/powerpoint/2010/main" id="1" dur="indefinite" restart="never" nodeType="tmRoot"/>
-      </p:par>
-    </p:tnLst>
-  </p:timing>
 </p:sld>
 </file>
 
@@ -3364,10 +3329,9 @@
           <a:lstStyle/>
           <a:p>
             <a:r>
-              <a:rPr lang="en-US" dirty="0" smtClean="0"/>
+              <a:rPr lang="en-US" dirty="0"/>
               <a:t>Why this makes sense</a:t>
             </a:r>
-            <a:endParaRPr lang="en-US" dirty="0"/>
           </a:p>
         </p:txBody>
       </p:sp>
@@ -3389,30 +3353,30 @@
           <a:lstStyle/>
           <a:p>
             <a:r>
-              <a:rPr lang="en-US" dirty="0" smtClean="0"/>
+              <a:rPr lang="en-US" dirty="0"/>
               <a:t>From the allocator point view, it can only control where to start for allocating an object, which cannot control memory accesses of the object itself. Therefore, whether all bytes of the cache lines are utilized may affect its cache utilization. </a:t>
             </a:r>
           </a:p>
           <a:p>
             <a:r>
-              <a:rPr lang="en-US" dirty="0" smtClean="0"/>
+              <a:rPr lang="en-US" dirty="0"/>
               <a:t>It assumes that the allocated objects will be fully utilized, which should be the case for most situations. </a:t>
             </a:r>
           </a:p>
           <a:p>
             <a:r>
-              <a:rPr lang="en-US" dirty="0" smtClean="0"/>
+              <a:rPr lang="en-US" dirty="0"/>
               <a:t>In the end, we could actually predict the performance using this parameter. </a:t>
             </a:r>
           </a:p>
           <a:p>
             <a:pPr lvl="1"/>
             <a:r>
-              <a:rPr lang="en-US" dirty="0" smtClean="0"/>
+              <a:rPr lang="en-US" dirty="0"/>
               <a:t>Low cache utilization rate </a:t>
             </a:r>
             <a:r>
-              <a:rPr lang="en-US" dirty="0" smtClean="0">
+              <a:rPr lang="en-US" dirty="0">
                 <a:sym typeface="Wingdings"/>
               </a:rPr>
               <a:t> higher cache misses</a:t>
@@ -3467,56 +3431,46 @@
           <a:lstStyle/>
           <a:p>
             <a:r>
-              <a:rPr lang="en-US" dirty="0" smtClean="0"/>
-              <a:t>Evaluate </a:t>
-            </a:r>
-            <a:r>
-              <a:rPr lang="en-US" dirty="0"/>
-              <a:t>C</a:t>
-            </a:r>
-            <a:r>
-              <a:rPr lang="en-US" dirty="0" smtClean="0"/>
-              <a:t>ache Friendliness</a:t>
-            </a:r>
+              <a:rPr lang="en-US" dirty="0"/>
+              <a:t>Evaluate Cache Friendliness</a:t>
+            </a:r>
+          </a:p>
+        </p:txBody>
+      </p:sp>
+      <p:sp>
+        <p:nvSpPr>
+          <p:cNvPr id="3" name="Content Placeholder 2"/>
+          <p:cNvSpPr>
+            <a:spLocks noGrp="1"/>
+          </p:cNvSpPr>
+          <p:nvPr>
+            <p:ph idx="1"/>
+          </p:nvPr>
+        </p:nvSpPr>
+        <p:spPr/>
+        <p:txBody>
+          <a:bodyPr/>
+          <a:lstStyle/>
+          <a:p>
+            <a:r>
+              <a:rPr lang="en-US" dirty="0"/>
+              <a:t>We will check whether the score is reversely proportional to the number of cache misses. </a:t>
+            </a:r>
+          </a:p>
+          <a:p>
+            <a:r>
+              <a:rPr lang="en-US" dirty="0"/>
+              <a:t>If yes, then we could evaluate it using the score. </a:t>
+            </a:r>
+          </a:p>
+          <a:p>
             <a:endParaRPr lang="en-US" dirty="0"/>
           </a:p>
-        </p:txBody>
-      </p:sp>
-      <p:sp>
-        <p:nvSpPr>
-          <p:cNvPr id="3" name="Content Placeholder 2"/>
-          <p:cNvSpPr>
-            <a:spLocks noGrp="1"/>
-          </p:cNvSpPr>
-          <p:nvPr>
-            <p:ph idx="1"/>
-          </p:nvPr>
-        </p:nvSpPr>
-        <p:spPr/>
-        <p:txBody>
-          <a:bodyPr/>
-          <a:lstStyle/>
-          <a:p>
-            <a:r>
-              <a:rPr lang="en-US" dirty="0" smtClean="0"/>
-              <a:t>We will check whether the score is reversely proportional to the number of cache misses. </a:t>
-            </a:r>
-          </a:p>
-          <a:p>
-            <a:r>
-              <a:rPr lang="en-US" dirty="0" smtClean="0"/>
-              <a:t>If yes, then we could evaluate it using the score. </a:t>
-            </a:r>
-          </a:p>
-          <a:p>
-            <a:endParaRPr lang="en-US" dirty="0"/>
-          </a:p>
-          <a:p>
-            <a:r>
-              <a:rPr lang="en-US" dirty="0" smtClean="0"/>
+          <a:p>
+            <a:r>
+              <a:rPr lang="en-US" dirty="0"/>
               <a:t>We could do the same for the page friendliness, and confirms the TLB misses (without using the large page). </a:t>
             </a:r>
-            <a:endParaRPr lang="en-US" dirty="0"/>
           </a:p>
         </p:txBody>
       </p:sp>
@@ -3566,10 +3520,9 @@
           <a:lstStyle/>
           <a:p>
             <a:r>
-              <a:rPr lang="en-US" dirty="0" smtClean="0"/>
+              <a:rPr lang="en-US" dirty="0"/>
               <a:t>False sharing of Object Collocation</a:t>
             </a:r>
-            <a:endParaRPr lang="en-US" dirty="0"/>
           </a:p>
         </p:txBody>
       </p:sp>
@@ -3591,26 +3544,25 @@
           <a:lstStyle/>
           <a:p>
             <a:r>
-              <a:rPr lang="en-US" dirty="0" smtClean="0"/>
+              <a:rPr lang="en-US" dirty="0"/>
               <a:t>Cache friendliness should utilize another parameter, whether an allocator introduces a lot of unnecessary cache invalidation or not. </a:t>
             </a:r>
           </a:p>
           <a:p>
             <a:r>
-              <a:rPr lang="en-US" dirty="0" smtClean="0"/>
+              <a:rPr lang="en-US" dirty="0"/>
               <a:t>This only occurs when there are multiple objects that share the same cache line. If multiple threads are using the same cache line, and multiple threads are accessing the same cache line. </a:t>
             </a:r>
           </a:p>
           <a:p>
             <a:r>
-              <a:rPr lang="en-US" dirty="0" err="1" smtClean="0"/>
+              <a:rPr lang="en-US" dirty="0" err="1"/>
               <a:t>Glibc</a:t>
             </a:r>
             <a:r>
-              <a:rPr lang="en-US" dirty="0" smtClean="0"/>
+              <a:rPr lang="en-US" dirty="0"/>
               <a:t> may have a higher problem for this case. </a:t>
             </a:r>
-            <a:endParaRPr lang="en-US" dirty="0"/>
           </a:p>
         </p:txBody>
       </p:sp>
@@ -3662,102 +3614,96 @@
           <a:lstStyle/>
           <a:p>
             <a:r>
-              <a:rPr lang="en-US" dirty="0" smtClean="0"/>
+              <a:rPr lang="en-US" dirty="0"/>
               <a:t>Potential Allocators To Be Evaluated</a:t>
             </a:r>
+          </a:p>
+        </p:txBody>
+      </p:sp>
+      <p:sp>
+        <p:nvSpPr>
+          <p:cNvPr id="3" name="Content Placeholder 2"/>
+          <p:cNvSpPr>
+            <a:spLocks noGrp="1"/>
+          </p:cNvSpPr>
+          <p:nvPr>
+            <p:ph idx="1"/>
+          </p:nvPr>
+        </p:nvSpPr>
+        <p:spPr/>
+        <p:txBody>
+          <a:bodyPr/>
+          <a:lstStyle/>
+          <a:p>
+            <a:r>
+              <a:rPr lang="en-US" dirty="0"/>
+              <a:t>General Allocator: </a:t>
+            </a:r>
+          </a:p>
+          <a:p>
+            <a:pPr lvl="1"/>
+            <a:r>
+              <a:rPr lang="en-US" dirty="0" err="1"/>
+              <a:t>Glibc</a:t>
+            </a:r>
             <a:endParaRPr lang="en-US" dirty="0"/>
           </a:p>
-        </p:txBody>
-      </p:sp>
-      <p:sp>
-        <p:nvSpPr>
-          <p:cNvPr id="3" name="Content Placeholder 2"/>
-          <p:cNvSpPr>
-            <a:spLocks noGrp="1"/>
-          </p:cNvSpPr>
-          <p:nvPr>
-            <p:ph idx="1"/>
-          </p:nvPr>
-        </p:nvSpPr>
-        <p:spPr/>
-        <p:txBody>
-          <a:bodyPr/>
-          <a:lstStyle/>
-          <a:p>
-            <a:r>
-              <a:rPr lang="en-US" dirty="0" smtClean="0"/>
-              <a:t>General Allocator: </a:t>
-            </a:r>
-          </a:p>
           <a:p>
             <a:pPr lvl="1"/>
             <a:r>
-              <a:rPr lang="en-US" dirty="0" err="1" smtClean="0"/>
-              <a:t>Glibc</a:t>
-            </a:r>
-            <a:endParaRPr lang="en-US" dirty="0" smtClean="0"/>
+              <a:rPr lang="en-US" dirty="0" err="1"/>
+              <a:t>TCMalloc</a:t>
+            </a:r>
+            <a:r>
+              <a:rPr lang="en-US" dirty="0"/>
+              <a:t> (Google)</a:t>
+            </a:r>
           </a:p>
           <a:p>
             <a:pPr lvl="1"/>
             <a:r>
-              <a:rPr lang="en-US" dirty="0" err="1" smtClean="0"/>
-              <a:t>TCMalloc</a:t>
+              <a:rPr lang="en-US" dirty="0" err="1"/>
+              <a:t>Jemalloc</a:t>
+            </a:r>
+            <a:r>
+              <a:rPr lang="en-US" dirty="0"/>
+              <a:t> (Facebook) /Hoard (Emery)</a:t>
+            </a:r>
+          </a:p>
+          <a:p>
+            <a:r>
+              <a:rPr lang="en-US" dirty="0"/>
+              <a:t>Secure Allocator:</a:t>
+            </a:r>
+          </a:p>
+          <a:p>
+            <a:pPr lvl="1"/>
+            <a:r>
+              <a:rPr lang="en-US" dirty="0" err="1"/>
+              <a:t>DieHarder</a:t>
+            </a:r>
+            <a:r>
+              <a:rPr lang="en-US" dirty="0"/>
+              <a:t> (Emery)</a:t>
+            </a:r>
+          </a:p>
+          <a:p>
+            <a:pPr lvl="1"/>
+            <a:r>
+              <a:rPr lang="en-US" dirty="0" err="1"/>
+              <a:t>OpenBSD</a:t>
             </a:r>
             <a:r>
               <a:rPr lang="en-US" dirty="0"/>
               <a:t> </a:t>
             </a:r>
-            <a:r>
-              <a:rPr lang="en-US" dirty="0" smtClean="0"/>
-              <a:t>(Google)</a:t>
-            </a:r>
           </a:p>
           <a:p>
             <a:pPr lvl="1"/>
             <a:r>
-              <a:rPr lang="en-US" dirty="0" err="1" smtClean="0"/>
-              <a:t>Jemalloc</a:t>
-            </a:r>
-            <a:r>
-              <a:rPr lang="en-US" dirty="0" smtClean="0"/>
-              <a:t> (Facebook) /Hoard (Emery)</a:t>
-            </a:r>
-          </a:p>
-          <a:p>
-            <a:r>
-              <a:rPr lang="en-US" dirty="0" smtClean="0"/>
-              <a:t>Secure Allocator:</a:t>
-            </a:r>
-          </a:p>
-          <a:p>
-            <a:pPr lvl="1"/>
-            <a:r>
-              <a:rPr lang="en-US" dirty="0" err="1" smtClean="0"/>
-              <a:t>DieHarder</a:t>
-            </a:r>
-            <a:r>
-              <a:rPr lang="en-US" dirty="0" smtClean="0"/>
-              <a:t> (Emery)</a:t>
-            </a:r>
-          </a:p>
-          <a:p>
-            <a:pPr lvl="1"/>
-            <a:r>
-              <a:rPr lang="en-US" dirty="0" err="1" smtClean="0"/>
-              <a:t>OpenBSD</a:t>
-            </a:r>
-            <a:r>
-              <a:rPr lang="en-US" dirty="0" smtClean="0"/>
-              <a:t> </a:t>
-            </a:r>
-          </a:p>
-          <a:p>
-            <a:pPr lvl="1"/>
-            <a:r>
-              <a:rPr lang="en-US" dirty="0" smtClean="0"/>
+              <a:rPr lang="en-US" dirty="0"/>
               <a:t>Guarder (our)</a:t>
             </a:r>
-            <a:endParaRPr lang="en-US" dirty="0"/>
           </a:p>
         </p:txBody>
       </p:sp>
@@ -3784,10 +3730,9 @@
           <a:lstStyle/>
           <a:p>
             <a:r>
-              <a:rPr lang="en-US" dirty="0" smtClean="0"/>
+              <a:rPr lang="en-US" dirty="0"/>
               <a:t>We may need to compare Secure Allocators with General Allocator</a:t>
             </a:r>
-            <a:endParaRPr lang="en-US" dirty="0"/>
           </a:p>
         </p:txBody>
       </p:sp>
@@ -3801,13 +3746,6 @@
   <p:clrMapOvr>
     <a:masterClrMapping/>
   </p:clrMapOvr>
-  <p:timing>
-    <p:tnLst>
-      <p:par>
-        <p:cTn xmlns:p14="http://schemas.microsoft.com/office/powerpoint/2010/main" id="1" dur="indefinite" restart="never" nodeType="tmRoot"/>
-      </p:par>
-    </p:tnLst>
-  </p:timing>
 </p:sld>
 </file>
 
@@ -3830,6 +3768,2396 @@
       </p:grpSpPr>
       <p:sp>
         <p:nvSpPr>
+          <p:cNvPr id="4" name="TextBox 3">
+            <a:extLst>
+              <a:ext uri="{FF2B5EF4-FFF2-40B4-BE49-F238E27FC236}">
+                <a16:creationId xmlns:a16="http://schemas.microsoft.com/office/drawing/2014/main" id="{44C6D75E-DBF7-514B-91F4-2FD5984A5D9E}"/>
+              </a:ext>
+            </a:extLst>
+          </p:cNvPr>
+          <p:cNvSpPr txBox="1"/>
+          <p:nvPr/>
+        </p:nvSpPr>
+        <p:spPr>
+          <a:xfrm>
+            <a:off x="1269656" y="1382898"/>
+            <a:ext cx="3771902" cy="261610"/>
+          </a:xfrm>
+          <a:prstGeom prst="rect">
+            <a:avLst/>
+          </a:prstGeom>
+          <a:noFill/>
+          <a:ln>
+            <a:solidFill>
+              <a:schemeClr val="tx1"/>
+            </a:solidFill>
+          </a:ln>
+        </p:spPr>
+        <p:txBody>
+          <a:bodyPr wrap="square" rtlCol="0" anchor="ctr" anchorCtr="0">
+            <a:spAutoFit/>
+          </a:bodyPr>
+          <a:lstStyle/>
+          <a:p>
+            <a:pPr algn="ctr"/>
+            <a:r>
+              <a:rPr lang="en-US" sz="1100" dirty="0">
+                <a:latin typeface="Times New Roman" panose="02020603050405020304" pitchFamily="18" charset="0"/>
+                <a:cs typeface="Times New Roman" panose="02020603050405020304" pitchFamily="18" charset="0"/>
+              </a:rPr>
+              <a:t>Applications</a:t>
+            </a:r>
+          </a:p>
+        </p:txBody>
+      </p:sp>
+      <p:sp>
+        <p:nvSpPr>
+          <p:cNvPr id="6" name="Rectangle 5">
+            <a:extLst>
+              <a:ext uri="{FF2B5EF4-FFF2-40B4-BE49-F238E27FC236}">
+                <a16:creationId xmlns:a16="http://schemas.microsoft.com/office/drawing/2014/main" id="{82CC9534-C698-F942-8985-00A3740014C7}"/>
+              </a:ext>
+            </a:extLst>
+          </p:cNvPr>
+          <p:cNvSpPr/>
+          <p:nvPr/>
+        </p:nvSpPr>
+        <p:spPr>
+          <a:xfrm>
+            <a:off x="1269656" y="2914824"/>
+            <a:ext cx="3771902" cy="818611"/>
+          </a:xfrm>
+          <a:prstGeom prst="rect">
+            <a:avLst/>
+          </a:prstGeom>
+          <a:noFill/>
+          <a:ln>
+            <a:solidFill>
+              <a:schemeClr val="tx1"/>
+            </a:solidFill>
+          </a:ln>
+          <a:effectLst/>
+        </p:spPr>
+        <p:style>
+          <a:lnRef idx="1">
+            <a:schemeClr val="accent1"/>
+          </a:lnRef>
+          <a:fillRef idx="3">
+            <a:schemeClr val="accent1"/>
+          </a:fillRef>
+          <a:effectRef idx="2">
+            <a:schemeClr val="accent1"/>
+          </a:effectRef>
+          <a:fontRef idx="minor">
+            <a:schemeClr val="lt1"/>
+          </a:fontRef>
+        </p:style>
+        <p:txBody>
+          <a:bodyPr rtlCol="0" anchor="ctr"/>
+          <a:lstStyle/>
+          <a:p>
+            <a:pPr algn="ctr"/>
+            <a:endParaRPr lang="en-US" sz="1100">
+              <a:latin typeface="Times New Roman" panose="02020603050405020304" pitchFamily="18" charset="0"/>
+              <a:cs typeface="Times New Roman" panose="02020603050405020304" pitchFamily="18" charset="0"/>
+            </a:endParaRPr>
+          </a:p>
+        </p:txBody>
+      </p:sp>
+      <p:sp>
+        <p:nvSpPr>
+          <p:cNvPr id="8" name="TextBox 7">
+            <a:extLst>
+              <a:ext uri="{FF2B5EF4-FFF2-40B4-BE49-F238E27FC236}">
+                <a16:creationId xmlns:a16="http://schemas.microsoft.com/office/drawing/2014/main" id="{E6C5B87F-C373-1C4E-983A-12A2D40F4AB8}"/>
+              </a:ext>
+            </a:extLst>
+          </p:cNvPr>
+          <p:cNvSpPr txBox="1"/>
+          <p:nvPr/>
+        </p:nvSpPr>
+        <p:spPr>
+          <a:xfrm>
+            <a:off x="1421031" y="2143525"/>
+            <a:ext cx="580388" cy="261610"/>
+          </a:xfrm>
+          <a:prstGeom prst="rect">
+            <a:avLst/>
+          </a:prstGeom>
+          <a:noFill/>
+          <a:ln>
+            <a:noFill/>
+          </a:ln>
+        </p:spPr>
+        <p:txBody>
+          <a:bodyPr wrap="square" rtlCol="0" anchor="ctr" anchorCtr="0">
+            <a:spAutoFit/>
+          </a:bodyPr>
+          <a:lstStyle/>
+          <a:p>
+            <a:pPr algn="ctr"/>
+            <a:r>
+              <a:rPr lang="en-US" sz="1100" dirty="0" err="1">
+                <a:latin typeface="Times New Roman" panose="02020603050405020304" pitchFamily="18" charset="0"/>
+                <a:cs typeface="Times New Roman" panose="02020603050405020304" pitchFamily="18" charset="0"/>
+              </a:rPr>
+              <a:t>Alloc</a:t>
+            </a:r>
+            <a:endParaRPr lang="en-US" sz="1100" dirty="0">
+              <a:latin typeface="Times New Roman" panose="02020603050405020304" pitchFamily="18" charset="0"/>
+              <a:cs typeface="Times New Roman" panose="02020603050405020304" pitchFamily="18" charset="0"/>
+            </a:endParaRPr>
+          </a:p>
+        </p:txBody>
+      </p:sp>
+      <p:sp>
+        <p:nvSpPr>
+          <p:cNvPr id="10" name="TextBox 9">
+            <a:extLst>
+              <a:ext uri="{FF2B5EF4-FFF2-40B4-BE49-F238E27FC236}">
+                <a16:creationId xmlns:a16="http://schemas.microsoft.com/office/drawing/2014/main" id="{D0A71874-E717-684A-8DF6-E2A4636B2217}"/>
+              </a:ext>
+            </a:extLst>
+          </p:cNvPr>
+          <p:cNvSpPr txBox="1"/>
+          <p:nvPr/>
+        </p:nvSpPr>
+        <p:spPr>
+          <a:xfrm>
+            <a:off x="3071938" y="2143525"/>
+            <a:ext cx="580388" cy="261610"/>
+          </a:xfrm>
+          <a:prstGeom prst="rect">
+            <a:avLst/>
+          </a:prstGeom>
+          <a:noFill/>
+          <a:ln>
+            <a:noFill/>
+          </a:ln>
+        </p:spPr>
+        <p:txBody>
+          <a:bodyPr wrap="square" rtlCol="0" anchor="ctr" anchorCtr="0">
+            <a:spAutoFit/>
+          </a:bodyPr>
+          <a:lstStyle/>
+          <a:p>
+            <a:pPr algn="ctr"/>
+            <a:r>
+              <a:rPr lang="en-US" sz="1100" dirty="0">
+                <a:latin typeface="Times New Roman" panose="02020603050405020304" pitchFamily="18" charset="0"/>
+                <a:cs typeface="Times New Roman" panose="02020603050405020304" pitchFamily="18" charset="0"/>
+              </a:rPr>
+              <a:t>Free</a:t>
+            </a:r>
+          </a:p>
+        </p:txBody>
+      </p:sp>
+      <p:sp>
+        <p:nvSpPr>
+          <p:cNvPr id="12" name="Rectangle 11">
+            <a:extLst>
+              <a:ext uri="{FF2B5EF4-FFF2-40B4-BE49-F238E27FC236}">
+                <a16:creationId xmlns:a16="http://schemas.microsoft.com/office/drawing/2014/main" id="{D8E4725E-7E8B-4740-A38C-65A278AEFF19}"/>
+              </a:ext>
+            </a:extLst>
+          </p:cNvPr>
+          <p:cNvSpPr/>
+          <p:nvPr/>
+        </p:nvSpPr>
+        <p:spPr>
+          <a:xfrm>
+            <a:off x="1934864" y="3037218"/>
+            <a:ext cx="813999" cy="213464"/>
+          </a:xfrm>
+          <a:prstGeom prst="rect">
+            <a:avLst/>
+          </a:prstGeom>
+          <a:noFill/>
+          <a:ln>
+            <a:solidFill>
+              <a:schemeClr val="tx1"/>
+            </a:solidFill>
+          </a:ln>
+          <a:effectLst/>
+        </p:spPr>
+        <p:style>
+          <a:lnRef idx="1">
+            <a:schemeClr val="accent1"/>
+          </a:lnRef>
+          <a:fillRef idx="3">
+            <a:schemeClr val="accent1"/>
+          </a:fillRef>
+          <a:effectRef idx="2">
+            <a:schemeClr val="accent1"/>
+          </a:effectRef>
+          <a:fontRef idx="minor">
+            <a:schemeClr val="lt1"/>
+          </a:fontRef>
+        </p:style>
+        <p:txBody>
+          <a:bodyPr rtlCol="0" anchor="ctr"/>
+          <a:lstStyle/>
+          <a:p>
+            <a:pPr algn="ctr"/>
+            <a:endParaRPr lang="en-US" sz="1100">
+              <a:latin typeface="Times New Roman" panose="02020603050405020304" pitchFamily="18" charset="0"/>
+              <a:cs typeface="Times New Roman" panose="02020603050405020304" pitchFamily="18" charset="0"/>
+            </a:endParaRPr>
+          </a:p>
+        </p:txBody>
+      </p:sp>
+      <p:sp>
+        <p:nvSpPr>
+          <p:cNvPr id="13" name="TextBox 12">
+            <a:extLst>
+              <a:ext uri="{FF2B5EF4-FFF2-40B4-BE49-F238E27FC236}">
+                <a16:creationId xmlns:a16="http://schemas.microsoft.com/office/drawing/2014/main" id="{4A445C8D-97C0-B444-A2B7-E50C544A6001}"/>
+              </a:ext>
+            </a:extLst>
+          </p:cNvPr>
+          <p:cNvSpPr txBox="1"/>
+          <p:nvPr/>
+        </p:nvSpPr>
+        <p:spPr>
+          <a:xfrm>
+            <a:off x="1952367" y="3011929"/>
+            <a:ext cx="778475" cy="261610"/>
+          </a:xfrm>
+          <a:prstGeom prst="rect">
+            <a:avLst/>
+          </a:prstGeom>
+          <a:noFill/>
+          <a:ln>
+            <a:noFill/>
+          </a:ln>
+        </p:spPr>
+        <p:txBody>
+          <a:bodyPr wrap="square" rtlCol="0" anchor="ctr" anchorCtr="0">
+            <a:spAutoFit/>
+          </a:bodyPr>
+          <a:lstStyle/>
+          <a:p>
+            <a:pPr algn="ctr"/>
+            <a:r>
+              <a:rPr lang="en-US" sz="1100" dirty="0" err="1">
+                <a:latin typeface="Times New Roman" panose="02020603050405020304" pitchFamily="18" charset="0"/>
+                <a:cs typeface="Times New Roman" panose="02020603050405020304" pitchFamily="18" charset="0"/>
+              </a:rPr>
+              <a:t>Alloc_Alg</a:t>
+            </a:r>
+            <a:endParaRPr lang="en-US" sz="1100" dirty="0">
+              <a:latin typeface="Times New Roman" panose="02020603050405020304" pitchFamily="18" charset="0"/>
+              <a:cs typeface="Times New Roman" panose="02020603050405020304" pitchFamily="18" charset="0"/>
+            </a:endParaRPr>
+          </a:p>
+        </p:txBody>
+      </p:sp>
+      <p:sp>
+        <p:nvSpPr>
+          <p:cNvPr id="14" name="Rectangle 13">
+            <a:extLst>
+              <a:ext uri="{FF2B5EF4-FFF2-40B4-BE49-F238E27FC236}">
+                <a16:creationId xmlns:a16="http://schemas.microsoft.com/office/drawing/2014/main" id="{48C98958-0A7F-5144-B880-2BB607CFA19B}"/>
+              </a:ext>
+            </a:extLst>
+          </p:cNvPr>
+          <p:cNvSpPr/>
+          <p:nvPr/>
+        </p:nvSpPr>
+        <p:spPr>
+          <a:xfrm>
+            <a:off x="1269656" y="4388698"/>
+            <a:ext cx="3771902" cy="488844"/>
+          </a:xfrm>
+          <a:prstGeom prst="rect">
+            <a:avLst/>
+          </a:prstGeom>
+          <a:noFill/>
+          <a:ln>
+            <a:solidFill>
+              <a:schemeClr val="tx1"/>
+            </a:solidFill>
+          </a:ln>
+          <a:effectLst/>
+        </p:spPr>
+        <p:style>
+          <a:lnRef idx="1">
+            <a:schemeClr val="accent1"/>
+          </a:lnRef>
+          <a:fillRef idx="3">
+            <a:schemeClr val="accent1"/>
+          </a:fillRef>
+          <a:effectRef idx="2">
+            <a:schemeClr val="accent1"/>
+          </a:effectRef>
+          <a:fontRef idx="minor">
+            <a:schemeClr val="lt1"/>
+          </a:fontRef>
+        </p:style>
+        <p:txBody>
+          <a:bodyPr rtlCol="0" anchor="ctr"/>
+          <a:lstStyle/>
+          <a:p>
+            <a:pPr algn="ctr"/>
+            <a:endParaRPr lang="en-US" sz="1100">
+              <a:latin typeface="Times New Roman" panose="02020603050405020304" pitchFamily="18" charset="0"/>
+              <a:cs typeface="Times New Roman" panose="02020603050405020304" pitchFamily="18" charset="0"/>
+            </a:endParaRPr>
+          </a:p>
+        </p:txBody>
+      </p:sp>
+      <p:sp>
+        <p:nvSpPr>
+          <p:cNvPr id="15" name="TextBox 14">
+            <a:extLst>
+              <a:ext uri="{FF2B5EF4-FFF2-40B4-BE49-F238E27FC236}">
+                <a16:creationId xmlns:a16="http://schemas.microsoft.com/office/drawing/2014/main" id="{F6CA0D46-C9BC-4D4A-A30C-2B841B1374E5}"/>
+              </a:ext>
+            </a:extLst>
+          </p:cNvPr>
+          <p:cNvSpPr txBox="1"/>
+          <p:nvPr/>
+        </p:nvSpPr>
+        <p:spPr>
+          <a:xfrm>
+            <a:off x="1269655" y="2657892"/>
+            <a:ext cx="778475" cy="261610"/>
+          </a:xfrm>
+          <a:prstGeom prst="rect">
+            <a:avLst/>
+          </a:prstGeom>
+          <a:noFill/>
+          <a:ln>
+            <a:noFill/>
+          </a:ln>
+        </p:spPr>
+        <p:txBody>
+          <a:bodyPr wrap="square" rtlCol="0" anchor="ctr" anchorCtr="0">
+            <a:spAutoFit/>
+          </a:bodyPr>
+          <a:lstStyle/>
+          <a:p>
+            <a:pPr algn="ctr"/>
+            <a:r>
+              <a:rPr lang="en-US" sz="1100" dirty="0">
+                <a:latin typeface="Times New Roman" panose="02020603050405020304" pitchFamily="18" charset="0"/>
+                <a:cs typeface="Times New Roman" panose="02020603050405020304" pitchFamily="18" charset="0"/>
+              </a:rPr>
+              <a:t>Allocator</a:t>
+            </a:r>
+          </a:p>
+        </p:txBody>
+      </p:sp>
+      <p:sp>
+        <p:nvSpPr>
+          <p:cNvPr id="16" name="TextBox 15">
+            <a:extLst>
+              <a:ext uri="{FF2B5EF4-FFF2-40B4-BE49-F238E27FC236}">
+                <a16:creationId xmlns:a16="http://schemas.microsoft.com/office/drawing/2014/main" id="{A76A5F8F-E94C-AE46-AD5A-B0511B31874F}"/>
+              </a:ext>
+            </a:extLst>
+          </p:cNvPr>
+          <p:cNvSpPr txBox="1"/>
+          <p:nvPr/>
+        </p:nvSpPr>
+        <p:spPr>
+          <a:xfrm>
+            <a:off x="1289033" y="4149261"/>
+            <a:ext cx="465630" cy="261610"/>
+          </a:xfrm>
+          <a:prstGeom prst="rect">
+            <a:avLst/>
+          </a:prstGeom>
+          <a:noFill/>
+          <a:ln>
+            <a:noFill/>
+          </a:ln>
+        </p:spPr>
+        <p:txBody>
+          <a:bodyPr wrap="square" rtlCol="0" anchor="ctr" anchorCtr="0">
+            <a:spAutoFit/>
+          </a:bodyPr>
+          <a:lstStyle/>
+          <a:p>
+            <a:pPr algn="ctr"/>
+            <a:r>
+              <a:rPr lang="en-US" sz="1100" dirty="0">
+                <a:latin typeface="Times New Roman" panose="02020603050405020304" pitchFamily="18" charset="0"/>
+                <a:cs typeface="Times New Roman" panose="02020603050405020304" pitchFamily="18" charset="0"/>
+              </a:rPr>
+              <a:t>OS</a:t>
+            </a:r>
+          </a:p>
+        </p:txBody>
+      </p:sp>
+      <p:sp>
+        <p:nvSpPr>
+          <p:cNvPr id="17" name="Up-Down Arrow 16">
+            <a:extLst>
+              <a:ext uri="{FF2B5EF4-FFF2-40B4-BE49-F238E27FC236}">
+                <a16:creationId xmlns:a16="http://schemas.microsoft.com/office/drawing/2014/main" id="{76E20DD8-18FA-1E41-BFCE-DFD0D177B9DE}"/>
+              </a:ext>
+            </a:extLst>
+          </p:cNvPr>
+          <p:cNvSpPr/>
+          <p:nvPr/>
+        </p:nvSpPr>
+        <p:spPr>
+          <a:xfrm>
+            <a:off x="2987244" y="3731737"/>
+            <a:ext cx="422804" cy="656962"/>
+          </a:xfrm>
+          <a:prstGeom prst="upDownArrow">
+            <a:avLst/>
+          </a:prstGeom>
+          <a:noFill/>
+          <a:ln>
+            <a:solidFill>
+              <a:schemeClr val="tx1"/>
+            </a:solidFill>
+          </a:ln>
+          <a:effectLst/>
+        </p:spPr>
+        <p:style>
+          <a:lnRef idx="1">
+            <a:schemeClr val="accent1"/>
+          </a:lnRef>
+          <a:fillRef idx="3">
+            <a:schemeClr val="accent1"/>
+          </a:fillRef>
+          <a:effectRef idx="2">
+            <a:schemeClr val="accent1"/>
+          </a:effectRef>
+          <a:fontRef idx="minor">
+            <a:schemeClr val="lt1"/>
+          </a:fontRef>
+        </p:style>
+        <p:txBody>
+          <a:bodyPr rtlCol="0" anchor="ctr"/>
+          <a:lstStyle/>
+          <a:p>
+            <a:pPr algn="ctr"/>
+            <a:endParaRPr lang="en-US" sz="1100">
+              <a:latin typeface="Times New Roman" panose="02020603050405020304" pitchFamily="18" charset="0"/>
+              <a:cs typeface="Times New Roman" panose="02020603050405020304" pitchFamily="18" charset="0"/>
+            </a:endParaRPr>
+          </a:p>
+        </p:txBody>
+      </p:sp>
+      <p:sp>
+        <p:nvSpPr>
+          <p:cNvPr id="18" name="TextBox 17">
+            <a:extLst>
+              <a:ext uri="{FF2B5EF4-FFF2-40B4-BE49-F238E27FC236}">
+                <a16:creationId xmlns:a16="http://schemas.microsoft.com/office/drawing/2014/main" id="{B48ED37D-E9D4-3849-8760-034B8301FEE2}"/>
+              </a:ext>
+            </a:extLst>
+          </p:cNvPr>
+          <p:cNvSpPr txBox="1"/>
+          <p:nvPr/>
+        </p:nvSpPr>
+        <p:spPr>
+          <a:xfrm>
+            <a:off x="2337101" y="3853670"/>
+            <a:ext cx="752866" cy="430887"/>
+          </a:xfrm>
+          <a:prstGeom prst="rect">
+            <a:avLst/>
+          </a:prstGeom>
+          <a:noFill/>
+          <a:ln>
+            <a:noFill/>
+          </a:ln>
+        </p:spPr>
+        <p:txBody>
+          <a:bodyPr wrap="square" rtlCol="0" anchor="ctr" anchorCtr="0">
+            <a:spAutoFit/>
+          </a:bodyPr>
+          <a:lstStyle/>
+          <a:p>
+            <a:pPr algn="ctr"/>
+            <a:r>
+              <a:rPr lang="en-US" sz="1100" dirty="0">
+                <a:latin typeface="Times New Roman" panose="02020603050405020304" pitchFamily="18" charset="0"/>
+                <a:cs typeface="Times New Roman" panose="02020603050405020304" pitchFamily="18" charset="0"/>
+              </a:rPr>
+              <a:t>Memory </a:t>
+            </a:r>
+            <a:r>
+              <a:rPr lang="en-US" sz="1100" dirty="0" err="1">
+                <a:latin typeface="Times New Roman" panose="02020603050405020304" pitchFamily="18" charset="0"/>
+                <a:cs typeface="Times New Roman" panose="02020603050405020304" pitchFamily="18" charset="0"/>
+              </a:rPr>
+              <a:t>Syscalls</a:t>
+            </a:r>
+            <a:endParaRPr lang="en-US" sz="1100" dirty="0">
+              <a:latin typeface="Times New Roman" panose="02020603050405020304" pitchFamily="18" charset="0"/>
+              <a:cs typeface="Times New Roman" panose="02020603050405020304" pitchFamily="18" charset="0"/>
+            </a:endParaRPr>
+          </a:p>
+        </p:txBody>
+      </p:sp>
+      <p:sp>
+        <p:nvSpPr>
+          <p:cNvPr id="19" name="TextBox 18">
+            <a:extLst>
+              <a:ext uri="{FF2B5EF4-FFF2-40B4-BE49-F238E27FC236}">
+                <a16:creationId xmlns:a16="http://schemas.microsoft.com/office/drawing/2014/main" id="{8460A87E-0EBB-A14C-BAE8-8896887C15C1}"/>
+              </a:ext>
+            </a:extLst>
+          </p:cNvPr>
+          <p:cNvSpPr txBox="1"/>
+          <p:nvPr/>
+        </p:nvSpPr>
+        <p:spPr>
+          <a:xfrm>
+            <a:off x="1970693" y="3350646"/>
+            <a:ext cx="778475" cy="261610"/>
+          </a:xfrm>
+          <a:prstGeom prst="rect">
+            <a:avLst/>
+          </a:prstGeom>
+          <a:noFill/>
+          <a:ln>
+            <a:noFill/>
+          </a:ln>
+        </p:spPr>
+        <p:txBody>
+          <a:bodyPr wrap="square" rtlCol="0" anchor="ctr" anchorCtr="0">
+            <a:spAutoFit/>
+          </a:bodyPr>
+          <a:lstStyle/>
+          <a:p>
+            <a:pPr algn="ctr"/>
+            <a:r>
+              <a:rPr lang="en-US" sz="1100" dirty="0" err="1">
+                <a:latin typeface="Times New Roman" panose="02020603050405020304" pitchFamily="18" charset="0"/>
+                <a:cs typeface="Times New Roman" panose="02020603050405020304" pitchFamily="18" charset="0"/>
+              </a:rPr>
+              <a:t>US_Syncs</a:t>
+            </a:r>
+            <a:endParaRPr lang="en-US" sz="1100" dirty="0">
+              <a:latin typeface="Times New Roman" panose="02020603050405020304" pitchFamily="18" charset="0"/>
+              <a:cs typeface="Times New Roman" panose="02020603050405020304" pitchFamily="18" charset="0"/>
+            </a:endParaRPr>
+          </a:p>
+        </p:txBody>
+      </p:sp>
+      <p:sp>
+        <p:nvSpPr>
+          <p:cNvPr id="20" name="Rectangle 19">
+            <a:extLst>
+              <a:ext uri="{FF2B5EF4-FFF2-40B4-BE49-F238E27FC236}">
+                <a16:creationId xmlns:a16="http://schemas.microsoft.com/office/drawing/2014/main" id="{7560C06F-4E36-414B-8195-A5BD30E88A41}"/>
+              </a:ext>
+            </a:extLst>
+          </p:cNvPr>
+          <p:cNvSpPr/>
+          <p:nvPr/>
+        </p:nvSpPr>
+        <p:spPr>
+          <a:xfrm>
+            <a:off x="1949279" y="3374719"/>
+            <a:ext cx="813999" cy="213464"/>
+          </a:xfrm>
+          <a:prstGeom prst="rect">
+            <a:avLst/>
+          </a:prstGeom>
+          <a:noFill/>
+          <a:ln>
+            <a:solidFill>
+              <a:schemeClr val="tx1"/>
+            </a:solidFill>
+          </a:ln>
+          <a:effectLst/>
+        </p:spPr>
+        <p:style>
+          <a:lnRef idx="1">
+            <a:schemeClr val="accent1"/>
+          </a:lnRef>
+          <a:fillRef idx="3">
+            <a:schemeClr val="accent1"/>
+          </a:fillRef>
+          <a:effectRef idx="2">
+            <a:schemeClr val="accent1"/>
+          </a:effectRef>
+          <a:fontRef idx="minor">
+            <a:schemeClr val="lt1"/>
+          </a:fontRef>
+        </p:style>
+        <p:txBody>
+          <a:bodyPr rtlCol="0" anchor="ctr"/>
+          <a:lstStyle/>
+          <a:p>
+            <a:pPr algn="ctr"/>
+            <a:endParaRPr lang="en-US" sz="1100">
+              <a:latin typeface="Times New Roman" panose="02020603050405020304" pitchFamily="18" charset="0"/>
+              <a:cs typeface="Times New Roman" panose="02020603050405020304" pitchFamily="18" charset="0"/>
+            </a:endParaRPr>
+          </a:p>
+        </p:txBody>
+      </p:sp>
+      <p:sp>
+        <p:nvSpPr>
+          <p:cNvPr id="21" name="Rectangle 20">
+            <a:extLst>
+              <a:ext uri="{FF2B5EF4-FFF2-40B4-BE49-F238E27FC236}">
+                <a16:creationId xmlns:a16="http://schemas.microsoft.com/office/drawing/2014/main" id="{532D623D-5AD8-0D47-AD0C-F40FB46CBF6A}"/>
+              </a:ext>
+            </a:extLst>
+          </p:cNvPr>
+          <p:cNvSpPr/>
+          <p:nvPr/>
+        </p:nvSpPr>
+        <p:spPr>
+          <a:xfrm>
+            <a:off x="3284880" y="3029430"/>
+            <a:ext cx="813999" cy="213464"/>
+          </a:xfrm>
+          <a:prstGeom prst="rect">
+            <a:avLst/>
+          </a:prstGeom>
+          <a:noFill/>
+          <a:ln>
+            <a:solidFill>
+              <a:schemeClr val="tx1"/>
+            </a:solidFill>
+          </a:ln>
+          <a:effectLst/>
+        </p:spPr>
+        <p:style>
+          <a:lnRef idx="1">
+            <a:schemeClr val="accent1"/>
+          </a:lnRef>
+          <a:fillRef idx="3">
+            <a:schemeClr val="accent1"/>
+          </a:fillRef>
+          <a:effectRef idx="2">
+            <a:schemeClr val="accent1"/>
+          </a:effectRef>
+          <a:fontRef idx="minor">
+            <a:schemeClr val="lt1"/>
+          </a:fontRef>
+        </p:style>
+        <p:txBody>
+          <a:bodyPr rtlCol="0" anchor="ctr"/>
+          <a:lstStyle/>
+          <a:p>
+            <a:pPr algn="ctr"/>
+            <a:endParaRPr lang="en-US" sz="1100">
+              <a:latin typeface="Times New Roman" panose="02020603050405020304" pitchFamily="18" charset="0"/>
+              <a:cs typeface="Times New Roman" panose="02020603050405020304" pitchFamily="18" charset="0"/>
+            </a:endParaRPr>
+          </a:p>
+        </p:txBody>
+      </p:sp>
+      <p:sp>
+        <p:nvSpPr>
+          <p:cNvPr id="22" name="TextBox 21">
+            <a:extLst>
+              <a:ext uri="{FF2B5EF4-FFF2-40B4-BE49-F238E27FC236}">
+                <a16:creationId xmlns:a16="http://schemas.microsoft.com/office/drawing/2014/main" id="{60D5E80F-57CC-A849-8584-B671CAD46FDA}"/>
+              </a:ext>
+            </a:extLst>
+          </p:cNvPr>
+          <p:cNvSpPr txBox="1"/>
+          <p:nvPr/>
+        </p:nvSpPr>
+        <p:spPr>
+          <a:xfrm>
+            <a:off x="3302383" y="3004141"/>
+            <a:ext cx="778475" cy="261610"/>
+          </a:xfrm>
+          <a:prstGeom prst="rect">
+            <a:avLst/>
+          </a:prstGeom>
+          <a:noFill/>
+          <a:ln>
+            <a:noFill/>
+          </a:ln>
+        </p:spPr>
+        <p:txBody>
+          <a:bodyPr wrap="square" rtlCol="0" anchor="ctr" anchorCtr="0">
+            <a:spAutoFit/>
+          </a:bodyPr>
+          <a:lstStyle/>
+          <a:p>
+            <a:pPr algn="ctr"/>
+            <a:r>
+              <a:rPr lang="en-US" sz="1100" dirty="0" err="1">
+                <a:latin typeface="Times New Roman" panose="02020603050405020304" pitchFamily="18" charset="0"/>
+                <a:cs typeface="Times New Roman" panose="02020603050405020304" pitchFamily="18" charset="0"/>
+              </a:rPr>
+              <a:t>Free_Alg</a:t>
+            </a:r>
+            <a:endParaRPr lang="en-US" sz="1100" dirty="0">
+              <a:latin typeface="Times New Roman" panose="02020603050405020304" pitchFamily="18" charset="0"/>
+              <a:cs typeface="Times New Roman" panose="02020603050405020304" pitchFamily="18" charset="0"/>
+            </a:endParaRPr>
+          </a:p>
+        </p:txBody>
+      </p:sp>
+      <p:sp>
+        <p:nvSpPr>
+          <p:cNvPr id="23" name="TextBox 22">
+            <a:extLst>
+              <a:ext uri="{FF2B5EF4-FFF2-40B4-BE49-F238E27FC236}">
+                <a16:creationId xmlns:a16="http://schemas.microsoft.com/office/drawing/2014/main" id="{F28F78A8-AF46-8340-8E01-CAE5CF065F9A}"/>
+              </a:ext>
+            </a:extLst>
+          </p:cNvPr>
+          <p:cNvSpPr txBox="1"/>
+          <p:nvPr/>
+        </p:nvSpPr>
+        <p:spPr>
+          <a:xfrm>
+            <a:off x="3320709" y="3342858"/>
+            <a:ext cx="778475" cy="261610"/>
+          </a:xfrm>
+          <a:prstGeom prst="rect">
+            <a:avLst/>
+          </a:prstGeom>
+          <a:noFill/>
+          <a:ln>
+            <a:noFill/>
+          </a:ln>
+        </p:spPr>
+        <p:txBody>
+          <a:bodyPr wrap="square" rtlCol="0" anchor="ctr" anchorCtr="0">
+            <a:spAutoFit/>
+          </a:bodyPr>
+          <a:lstStyle/>
+          <a:p>
+            <a:pPr algn="ctr"/>
+            <a:r>
+              <a:rPr lang="en-US" sz="1100" dirty="0" err="1">
+                <a:latin typeface="Times New Roman" panose="02020603050405020304" pitchFamily="18" charset="0"/>
+                <a:cs typeface="Times New Roman" panose="02020603050405020304" pitchFamily="18" charset="0"/>
+              </a:rPr>
+              <a:t>US_Syncs</a:t>
+            </a:r>
+            <a:endParaRPr lang="en-US" sz="1100" dirty="0">
+              <a:latin typeface="Times New Roman" panose="02020603050405020304" pitchFamily="18" charset="0"/>
+              <a:cs typeface="Times New Roman" panose="02020603050405020304" pitchFamily="18" charset="0"/>
+            </a:endParaRPr>
+          </a:p>
+        </p:txBody>
+      </p:sp>
+      <p:sp>
+        <p:nvSpPr>
+          <p:cNvPr id="24" name="Rectangle 23">
+            <a:extLst>
+              <a:ext uri="{FF2B5EF4-FFF2-40B4-BE49-F238E27FC236}">
+                <a16:creationId xmlns:a16="http://schemas.microsoft.com/office/drawing/2014/main" id="{A6C681DA-9A98-C941-97C5-E211924457E5}"/>
+              </a:ext>
+            </a:extLst>
+          </p:cNvPr>
+          <p:cNvSpPr/>
+          <p:nvPr/>
+        </p:nvSpPr>
+        <p:spPr>
+          <a:xfrm>
+            <a:off x="3299295" y="3366931"/>
+            <a:ext cx="813999" cy="213464"/>
+          </a:xfrm>
+          <a:prstGeom prst="rect">
+            <a:avLst/>
+          </a:prstGeom>
+          <a:noFill/>
+          <a:ln>
+            <a:solidFill>
+              <a:schemeClr val="tx1"/>
+            </a:solidFill>
+          </a:ln>
+          <a:effectLst/>
+        </p:spPr>
+        <p:style>
+          <a:lnRef idx="1">
+            <a:schemeClr val="accent1"/>
+          </a:lnRef>
+          <a:fillRef idx="3">
+            <a:schemeClr val="accent1"/>
+          </a:fillRef>
+          <a:effectRef idx="2">
+            <a:schemeClr val="accent1"/>
+          </a:effectRef>
+          <a:fontRef idx="minor">
+            <a:schemeClr val="lt1"/>
+          </a:fontRef>
+        </p:style>
+        <p:txBody>
+          <a:bodyPr rtlCol="0" anchor="ctr"/>
+          <a:lstStyle/>
+          <a:p>
+            <a:pPr algn="ctr"/>
+            <a:endParaRPr lang="en-US" sz="1100">
+              <a:latin typeface="Times New Roman" panose="02020603050405020304" pitchFamily="18" charset="0"/>
+              <a:cs typeface="Times New Roman" panose="02020603050405020304" pitchFamily="18" charset="0"/>
+            </a:endParaRPr>
+          </a:p>
+        </p:txBody>
+      </p:sp>
+      <p:sp>
+        <p:nvSpPr>
+          <p:cNvPr id="25" name="TextBox 24">
+            <a:extLst>
+              <a:ext uri="{FF2B5EF4-FFF2-40B4-BE49-F238E27FC236}">
+                <a16:creationId xmlns:a16="http://schemas.microsoft.com/office/drawing/2014/main" id="{F7A4028C-A7B1-B244-8B28-D23B25975C05}"/>
+              </a:ext>
+            </a:extLst>
+          </p:cNvPr>
+          <p:cNvSpPr txBox="1"/>
+          <p:nvPr/>
+        </p:nvSpPr>
+        <p:spPr>
+          <a:xfrm>
+            <a:off x="2772849" y="4483535"/>
+            <a:ext cx="965573" cy="261610"/>
+          </a:xfrm>
+          <a:prstGeom prst="rect">
+            <a:avLst/>
+          </a:prstGeom>
+          <a:noFill/>
+          <a:ln>
+            <a:noFill/>
+          </a:ln>
+        </p:spPr>
+        <p:txBody>
+          <a:bodyPr wrap="square" rtlCol="0" anchor="ctr" anchorCtr="0">
+            <a:spAutoFit/>
+          </a:bodyPr>
+          <a:lstStyle/>
+          <a:p>
+            <a:pPr algn="ctr"/>
+            <a:r>
+              <a:rPr lang="en-US" sz="1100" dirty="0" err="1">
+                <a:latin typeface="Times New Roman" panose="02020603050405020304" pitchFamily="18" charset="0"/>
+                <a:cs typeface="Times New Roman" panose="02020603050405020304" pitchFamily="18" charset="0"/>
+              </a:rPr>
+              <a:t>KS_Syncs</a:t>
+            </a:r>
+            <a:endParaRPr lang="en-US" sz="1100" dirty="0">
+              <a:latin typeface="Times New Roman" panose="02020603050405020304" pitchFamily="18" charset="0"/>
+              <a:cs typeface="Times New Roman" panose="02020603050405020304" pitchFamily="18" charset="0"/>
+            </a:endParaRPr>
+          </a:p>
+        </p:txBody>
+      </p:sp>
+      <p:sp>
+        <p:nvSpPr>
+          <p:cNvPr id="26" name="Rectangle 25">
+            <a:extLst>
+              <a:ext uri="{FF2B5EF4-FFF2-40B4-BE49-F238E27FC236}">
+                <a16:creationId xmlns:a16="http://schemas.microsoft.com/office/drawing/2014/main" id="{75736366-4885-6544-8BA1-4D0A8C94B51A}"/>
+              </a:ext>
+            </a:extLst>
+          </p:cNvPr>
+          <p:cNvSpPr/>
+          <p:nvPr/>
+        </p:nvSpPr>
+        <p:spPr>
+          <a:xfrm>
+            <a:off x="2864215" y="4507608"/>
+            <a:ext cx="813999" cy="213464"/>
+          </a:xfrm>
+          <a:prstGeom prst="rect">
+            <a:avLst/>
+          </a:prstGeom>
+          <a:noFill/>
+          <a:ln>
+            <a:solidFill>
+              <a:schemeClr val="tx1"/>
+            </a:solidFill>
+          </a:ln>
+          <a:effectLst/>
+        </p:spPr>
+        <p:style>
+          <a:lnRef idx="1">
+            <a:schemeClr val="accent1"/>
+          </a:lnRef>
+          <a:fillRef idx="3">
+            <a:schemeClr val="accent1"/>
+          </a:fillRef>
+          <a:effectRef idx="2">
+            <a:schemeClr val="accent1"/>
+          </a:effectRef>
+          <a:fontRef idx="minor">
+            <a:schemeClr val="lt1"/>
+          </a:fontRef>
+        </p:style>
+        <p:txBody>
+          <a:bodyPr rtlCol="0" anchor="ctr"/>
+          <a:lstStyle/>
+          <a:p>
+            <a:pPr algn="ctr"/>
+            <a:endParaRPr lang="en-US" sz="1100">
+              <a:latin typeface="Times New Roman" panose="02020603050405020304" pitchFamily="18" charset="0"/>
+              <a:cs typeface="Times New Roman" panose="02020603050405020304" pitchFamily="18" charset="0"/>
+            </a:endParaRPr>
+          </a:p>
+        </p:txBody>
+      </p:sp>
+      <p:cxnSp>
+        <p:nvCxnSpPr>
+          <p:cNvPr id="28" name="Straight Connector 27">
+            <a:extLst>
+              <a:ext uri="{FF2B5EF4-FFF2-40B4-BE49-F238E27FC236}">
+                <a16:creationId xmlns:a16="http://schemas.microsoft.com/office/drawing/2014/main" id="{DCB9774A-D389-5840-8F16-96DBC48CC0C8}"/>
+              </a:ext>
+            </a:extLst>
+          </p:cNvPr>
+          <p:cNvCxnSpPr>
+            <a:cxnSpLocks/>
+          </p:cNvCxnSpPr>
+          <p:nvPr/>
+        </p:nvCxnSpPr>
+        <p:spPr>
+          <a:xfrm>
+            <a:off x="5832388" y="863423"/>
+            <a:ext cx="1025611" cy="0"/>
+          </a:xfrm>
+          <a:prstGeom prst="line">
+            <a:avLst/>
+          </a:prstGeom>
+          <a:ln>
+            <a:solidFill>
+              <a:schemeClr val="tx1"/>
+            </a:solidFill>
+          </a:ln>
+          <a:effectLst/>
+        </p:spPr>
+        <p:style>
+          <a:lnRef idx="2">
+            <a:schemeClr val="accent1"/>
+          </a:lnRef>
+          <a:fillRef idx="0">
+            <a:schemeClr val="accent1"/>
+          </a:fillRef>
+          <a:effectRef idx="1">
+            <a:schemeClr val="accent1"/>
+          </a:effectRef>
+          <a:fontRef idx="minor">
+            <a:schemeClr val="tx1"/>
+          </a:fontRef>
+        </p:style>
+      </p:cxnSp>
+      <p:sp>
+        <p:nvSpPr>
+          <p:cNvPr id="30" name="TextBox 29">
+            <a:extLst>
+              <a:ext uri="{FF2B5EF4-FFF2-40B4-BE49-F238E27FC236}">
+                <a16:creationId xmlns:a16="http://schemas.microsoft.com/office/drawing/2014/main" id="{A2B40B71-0B35-A746-9A23-6C8889F66F41}"/>
+              </a:ext>
+            </a:extLst>
+          </p:cNvPr>
+          <p:cNvSpPr txBox="1"/>
+          <p:nvPr/>
+        </p:nvSpPr>
+        <p:spPr>
+          <a:xfrm>
+            <a:off x="5543382" y="1225689"/>
+            <a:ext cx="2741456" cy="6463308"/>
+          </a:xfrm>
+          <a:prstGeom prst="rect">
+            <a:avLst/>
+          </a:prstGeom>
+          <a:noFill/>
+        </p:spPr>
+        <p:txBody>
+          <a:bodyPr wrap="none" rtlCol="0">
+            <a:spAutoFit/>
+          </a:bodyPr>
+          <a:lstStyle/>
+          <a:p>
+            <a:pPr marL="342900" indent="-342900">
+              <a:buAutoNum type="arabicPeriod"/>
+            </a:pPr>
+            <a:r>
+              <a:rPr lang="en-US" dirty="0"/>
+              <a:t>Allocation algorithm:</a:t>
+            </a:r>
+          </a:p>
+          <a:p>
+            <a:r>
+              <a:rPr lang="en-US" dirty="0"/>
+              <a:t>       a. Instructions</a:t>
+            </a:r>
+          </a:p>
+          <a:p>
+            <a:r>
+              <a:rPr lang="en-US" dirty="0"/>
+              <a:t>       b. Allocation time</a:t>
+            </a:r>
+          </a:p>
+          <a:p>
+            <a:r>
+              <a:rPr lang="en-US" dirty="0"/>
+              <a:t>        c. Cache misses</a:t>
+            </a:r>
+          </a:p>
+          <a:p>
+            <a:r>
+              <a:rPr lang="en-US" dirty="0"/>
+              <a:t>	d. TLB misses</a:t>
+            </a:r>
+          </a:p>
+          <a:p>
+            <a:pPr marL="342900" indent="-342900">
+              <a:buAutoNum type="arabicPeriod" startAt="2"/>
+            </a:pPr>
+            <a:r>
+              <a:rPr lang="en-US" dirty="0" err="1"/>
+              <a:t>US_Syncs</a:t>
+            </a:r>
+            <a:endParaRPr lang="en-US" dirty="0"/>
+          </a:p>
+          <a:p>
+            <a:r>
+              <a:rPr lang="en-US" dirty="0"/>
+              <a:t>       a. # of separate locks</a:t>
+            </a:r>
+          </a:p>
+          <a:p>
+            <a:r>
+              <a:rPr lang="en-US" dirty="0"/>
+              <a:t>       b. # of lock acquisitions</a:t>
+            </a:r>
+          </a:p>
+          <a:p>
+            <a:r>
+              <a:rPr lang="en-US" dirty="0"/>
+              <a:t>        c. Average Lock time</a:t>
+            </a:r>
+          </a:p>
+          <a:p>
+            <a:r>
+              <a:rPr lang="en-US" dirty="0"/>
+              <a:t>3. </a:t>
+            </a:r>
+            <a:r>
+              <a:rPr lang="en-US" dirty="0" err="1"/>
+              <a:t>KS_Syncs</a:t>
+            </a:r>
+            <a:endParaRPr lang="en-US" dirty="0"/>
+          </a:p>
+          <a:p>
+            <a:r>
+              <a:rPr lang="en-US" dirty="0"/>
+              <a:t>      a. # of system calls</a:t>
+            </a:r>
+          </a:p>
+          <a:p>
+            <a:r>
+              <a:rPr lang="en-US" dirty="0"/>
+              <a:t>       b. Average </a:t>
+            </a:r>
+            <a:r>
+              <a:rPr lang="en-US" dirty="0" err="1"/>
+              <a:t>syscall</a:t>
+            </a:r>
+            <a:r>
+              <a:rPr lang="en-US" dirty="0"/>
+              <a:t> time</a:t>
+            </a:r>
+          </a:p>
+          <a:p>
+            <a:r>
+              <a:rPr lang="en-US" dirty="0"/>
+              <a:t>4. Memory re-utilization</a:t>
+            </a:r>
+          </a:p>
+          <a:p>
+            <a:r>
+              <a:rPr lang="en-US" dirty="0"/>
+              <a:t>       a. how fast</a:t>
+            </a:r>
+          </a:p>
+          <a:p>
+            <a:r>
+              <a:rPr lang="en-US" dirty="0"/>
+              <a:t>       b. how much</a:t>
+            </a:r>
+          </a:p>
+          <a:p>
+            <a:r>
+              <a:rPr lang="en-US" dirty="0"/>
+              <a:t>       </a:t>
+            </a:r>
+          </a:p>
+          <a:p>
+            <a:r>
+              <a:rPr lang="en-US" dirty="0"/>
+              <a:t>Application friendliness:</a:t>
+            </a:r>
+          </a:p>
+          <a:p>
+            <a:pPr marL="342900" indent="-342900">
+              <a:buAutoNum type="arabicPeriod"/>
+            </a:pPr>
+            <a:r>
+              <a:rPr lang="en-US" dirty="0"/>
+              <a:t>Cache friendliness: </a:t>
+            </a:r>
+          </a:p>
+          <a:p>
+            <a:r>
+              <a:rPr lang="en-US" dirty="0"/>
+              <a:t>	a. Cache fullness</a:t>
+            </a:r>
+          </a:p>
+          <a:p>
+            <a:r>
+              <a:rPr lang="en-US" dirty="0"/>
+              <a:t>        b. Cache Misses </a:t>
+            </a:r>
+          </a:p>
+          <a:p>
+            <a:pPr marL="342900" indent="-342900">
+              <a:buAutoNum type="arabicPeriod"/>
+            </a:pPr>
+            <a:r>
+              <a:rPr lang="en-US" dirty="0"/>
+              <a:t>  TLB friendliness</a:t>
+            </a:r>
+          </a:p>
+          <a:p>
+            <a:r>
+              <a:rPr lang="en-US" dirty="0"/>
+              <a:t>	a. Page Fullness</a:t>
+            </a:r>
+          </a:p>
+          <a:p>
+            <a:r>
+              <a:rPr lang="en-US" dirty="0"/>
+              <a:t>	b. TLB misses      </a:t>
+            </a:r>
+          </a:p>
+        </p:txBody>
+      </p:sp>
+      <p:cxnSp>
+        <p:nvCxnSpPr>
+          <p:cNvPr id="32" name="Straight Arrow Connector 31">
+            <a:extLst>
+              <a:ext uri="{FF2B5EF4-FFF2-40B4-BE49-F238E27FC236}">
+                <a16:creationId xmlns:a16="http://schemas.microsoft.com/office/drawing/2014/main" id="{84FB4DAE-5C9D-CD4B-A230-EFF186ED87FD}"/>
+              </a:ext>
+            </a:extLst>
+          </p:cNvPr>
+          <p:cNvCxnSpPr>
+            <a:cxnSpLocks/>
+          </p:cNvCxnSpPr>
+          <p:nvPr/>
+        </p:nvCxnSpPr>
+        <p:spPr>
+          <a:xfrm flipH="1">
+            <a:off x="2001419" y="1644508"/>
+            <a:ext cx="6553" cy="1270316"/>
+          </a:xfrm>
+          <a:prstGeom prst="straightConnector1">
+            <a:avLst/>
+          </a:prstGeom>
+          <a:ln>
+            <a:solidFill>
+              <a:schemeClr val="tx1"/>
+            </a:solidFill>
+            <a:tailEnd type="triangle"/>
+          </a:ln>
+          <a:effectLst/>
+        </p:spPr>
+        <p:style>
+          <a:lnRef idx="2">
+            <a:schemeClr val="accent1"/>
+          </a:lnRef>
+          <a:fillRef idx="0">
+            <a:schemeClr val="accent1"/>
+          </a:fillRef>
+          <a:effectRef idx="1">
+            <a:schemeClr val="accent1"/>
+          </a:effectRef>
+          <a:fontRef idx="minor">
+            <a:schemeClr val="tx1"/>
+          </a:fontRef>
+        </p:style>
+      </p:cxnSp>
+      <p:cxnSp>
+        <p:nvCxnSpPr>
+          <p:cNvPr id="34" name="Straight Arrow Connector 33">
+            <a:extLst>
+              <a:ext uri="{FF2B5EF4-FFF2-40B4-BE49-F238E27FC236}">
+                <a16:creationId xmlns:a16="http://schemas.microsoft.com/office/drawing/2014/main" id="{4AE86610-4E1A-2B41-B36D-44752C1BBE83}"/>
+              </a:ext>
+            </a:extLst>
+          </p:cNvPr>
+          <p:cNvCxnSpPr>
+            <a:cxnSpLocks/>
+          </p:cNvCxnSpPr>
+          <p:nvPr/>
+        </p:nvCxnSpPr>
+        <p:spPr>
+          <a:xfrm flipV="1">
+            <a:off x="2164581" y="1651925"/>
+            <a:ext cx="0" cy="1262899"/>
+          </a:xfrm>
+          <a:prstGeom prst="straightConnector1">
+            <a:avLst/>
+          </a:prstGeom>
+          <a:ln>
+            <a:solidFill>
+              <a:schemeClr val="tx1"/>
+            </a:solidFill>
+            <a:tailEnd type="triangle"/>
+          </a:ln>
+          <a:effectLst/>
+        </p:spPr>
+        <p:style>
+          <a:lnRef idx="2">
+            <a:schemeClr val="accent1"/>
+          </a:lnRef>
+          <a:fillRef idx="0">
+            <a:schemeClr val="accent1"/>
+          </a:fillRef>
+          <a:effectRef idx="1">
+            <a:schemeClr val="accent1"/>
+          </a:effectRef>
+          <a:fontRef idx="minor">
+            <a:schemeClr val="tx1"/>
+          </a:fontRef>
+        </p:style>
+      </p:cxnSp>
+      <p:cxnSp>
+        <p:nvCxnSpPr>
+          <p:cNvPr id="38" name="Straight Arrow Connector 37">
+            <a:extLst>
+              <a:ext uri="{FF2B5EF4-FFF2-40B4-BE49-F238E27FC236}">
+                <a16:creationId xmlns:a16="http://schemas.microsoft.com/office/drawing/2014/main" id="{AFD88467-AB9C-294A-A9C9-F162093AAB23}"/>
+              </a:ext>
+            </a:extLst>
+          </p:cNvPr>
+          <p:cNvCxnSpPr>
+            <a:cxnSpLocks/>
+          </p:cNvCxnSpPr>
+          <p:nvPr/>
+        </p:nvCxnSpPr>
+        <p:spPr>
+          <a:xfrm flipH="1">
+            <a:off x="3686920" y="1648327"/>
+            <a:ext cx="6553" cy="1270316"/>
+          </a:xfrm>
+          <a:prstGeom prst="straightConnector1">
+            <a:avLst/>
+          </a:prstGeom>
+          <a:ln>
+            <a:solidFill>
+              <a:schemeClr val="tx1"/>
+            </a:solidFill>
+            <a:tailEnd type="triangle"/>
+          </a:ln>
+          <a:effectLst/>
+        </p:spPr>
+        <p:style>
+          <a:lnRef idx="2">
+            <a:schemeClr val="accent1"/>
+          </a:lnRef>
+          <a:fillRef idx="0">
+            <a:schemeClr val="accent1"/>
+          </a:fillRef>
+          <a:effectRef idx="1">
+            <a:schemeClr val="accent1"/>
+          </a:effectRef>
+          <a:fontRef idx="minor">
+            <a:schemeClr val="tx1"/>
+          </a:fontRef>
+        </p:style>
+      </p:cxnSp>
+      <p:cxnSp>
+        <p:nvCxnSpPr>
+          <p:cNvPr id="39" name="Straight Arrow Connector 38">
+            <a:extLst>
+              <a:ext uri="{FF2B5EF4-FFF2-40B4-BE49-F238E27FC236}">
+                <a16:creationId xmlns:a16="http://schemas.microsoft.com/office/drawing/2014/main" id="{523A0679-5E01-D340-B715-CAE2D13AB62D}"/>
+              </a:ext>
+            </a:extLst>
+          </p:cNvPr>
+          <p:cNvCxnSpPr>
+            <a:cxnSpLocks/>
+          </p:cNvCxnSpPr>
+          <p:nvPr/>
+        </p:nvCxnSpPr>
+        <p:spPr>
+          <a:xfrm flipV="1">
+            <a:off x="3850082" y="1655744"/>
+            <a:ext cx="0" cy="1262899"/>
+          </a:xfrm>
+          <a:prstGeom prst="straightConnector1">
+            <a:avLst/>
+          </a:prstGeom>
+          <a:ln>
+            <a:solidFill>
+              <a:schemeClr val="tx1"/>
+            </a:solidFill>
+            <a:tailEnd type="triangle"/>
+          </a:ln>
+          <a:effectLst/>
+        </p:spPr>
+        <p:style>
+          <a:lnRef idx="2">
+            <a:schemeClr val="accent1"/>
+          </a:lnRef>
+          <a:fillRef idx="0">
+            <a:schemeClr val="accent1"/>
+          </a:fillRef>
+          <a:effectRef idx="1">
+            <a:schemeClr val="accent1"/>
+          </a:effectRef>
+          <a:fontRef idx="minor">
+            <a:schemeClr val="tx1"/>
+          </a:fontRef>
+        </p:style>
+      </p:cxnSp>
+    </p:spTree>
+    <p:extLst>
+      <p:ext uri="{BB962C8B-B14F-4D97-AF65-F5344CB8AC3E}">
+        <p14:creationId xmlns:p14="http://schemas.microsoft.com/office/powerpoint/2010/main" val="1483409994"/>
+      </p:ext>
+    </p:extLst>
+  </p:cSld>
+  <p:clrMapOvr>
+    <a:masterClrMapping/>
+  </p:clrMapOvr>
+</p:sld>
+</file>
+
+<file path=ppt/slides/slide16.xml><?xml version="1.0" encoding="utf-8"?>
+<p:sld xmlns:a="http://schemas.openxmlformats.org/drawingml/2006/main" xmlns:r="http://schemas.openxmlformats.org/officeDocument/2006/relationships" xmlns:p="http://schemas.openxmlformats.org/presentationml/2006/main">
+  <p:cSld>
+    <p:spTree>
+      <p:nvGrpSpPr>
+        <p:cNvPr id="1" name=""/>
+        <p:cNvGrpSpPr/>
+        <p:nvPr/>
+      </p:nvGrpSpPr>
+      <p:grpSpPr>
+        <a:xfrm>
+          <a:off x="0" y="0"/>
+          <a:ext cx="0" cy="0"/>
+          <a:chOff x="0" y="0"/>
+          <a:chExt cx="0" cy="0"/>
+        </a:xfrm>
+      </p:grpSpPr>
+      <p:sp>
+        <p:nvSpPr>
+          <p:cNvPr id="4" name="TextBox 3">
+            <a:extLst>
+              <a:ext uri="{FF2B5EF4-FFF2-40B4-BE49-F238E27FC236}">
+                <a16:creationId xmlns:a16="http://schemas.microsoft.com/office/drawing/2014/main" id="{44C6D75E-DBF7-514B-91F4-2FD5984A5D9E}"/>
+              </a:ext>
+            </a:extLst>
+          </p:cNvPr>
+          <p:cNvSpPr txBox="1"/>
+          <p:nvPr/>
+        </p:nvSpPr>
+        <p:spPr>
+          <a:xfrm>
+            <a:off x="4080858" y="1386781"/>
+            <a:ext cx="1097280" cy="261610"/>
+          </a:xfrm>
+          <a:prstGeom prst="rect">
+            <a:avLst/>
+          </a:prstGeom>
+          <a:noFill/>
+          <a:ln>
+            <a:solidFill>
+              <a:schemeClr val="tx1"/>
+            </a:solidFill>
+          </a:ln>
+        </p:spPr>
+        <p:txBody>
+          <a:bodyPr wrap="square" rtlCol="0" anchor="ctr" anchorCtr="0">
+            <a:spAutoFit/>
+          </a:bodyPr>
+          <a:lstStyle/>
+          <a:p>
+            <a:pPr algn="ctr"/>
+            <a:r>
+              <a:rPr lang="en-US" sz="1100" dirty="0">
+                <a:latin typeface="Times New Roman" panose="02020603050405020304" pitchFamily="18" charset="0"/>
+                <a:cs typeface="Times New Roman" panose="02020603050405020304" pitchFamily="18" charset="0"/>
+              </a:rPr>
+              <a:t>Application</a:t>
+            </a:r>
+          </a:p>
+        </p:txBody>
+      </p:sp>
+      <p:sp>
+        <p:nvSpPr>
+          <p:cNvPr id="14" name="Rectangle 13">
+            <a:extLst>
+              <a:ext uri="{FF2B5EF4-FFF2-40B4-BE49-F238E27FC236}">
+                <a16:creationId xmlns:a16="http://schemas.microsoft.com/office/drawing/2014/main" id="{48C98958-0A7F-5144-B880-2BB607CFA19B}"/>
+              </a:ext>
+            </a:extLst>
+          </p:cNvPr>
+          <p:cNvSpPr/>
+          <p:nvPr/>
+        </p:nvSpPr>
+        <p:spPr>
+          <a:xfrm>
+            <a:off x="4080858" y="2118162"/>
+            <a:ext cx="1097280" cy="265176"/>
+          </a:xfrm>
+          <a:prstGeom prst="rect">
+            <a:avLst/>
+          </a:prstGeom>
+          <a:noFill/>
+          <a:ln>
+            <a:solidFill>
+              <a:schemeClr val="tx1"/>
+            </a:solidFill>
+          </a:ln>
+          <a:effectLst/>
+        </p:spPr>
+        <p:style>
+          <a:lnRef idx="1">
+            <a:schemeClr val="accent1"/>
+          </a:lnRef>
+          <a:fillRef idx="3">
+            <a:schemeClr val="accent1"/>
+          </a:fillRef>
+          <a:effectRef idx="2">
+            <a:schemeClr val="accent1"/>
+          </a:effectRef>
+          <a:fontRef idx="minor">
+            <a:schemeClr val="lt1"/>
+          </a:fontRef>
+        </p:style>
+        <p:txBody>
+          <a:bodyPr rtlCol="0" anchor="ctr"/>
+          <a:lstStyle/>
+          <a:p>
+            <a:pPr algn="ctr"/>
+            <a:r>
+              <a:rPr lang="en-US" sz="1100" dirty="0">
+                <a:solidFill>
+                  <a:schemeClr val="tx1"/>
+                </a:solidFill>
+                <a:latin typeface="Times New Roman" panose="02020603050405020304" pitchFamily="18" charset="0"/>
+                <a:cs typeface="Times New Roman" panose="02020603050405020304" pitchFamily="18" charset="0"/>
+              </a:rPr>
+              <a:t>Allocator</a:t>
+            </a:r>
+          </a:p>
+        </p:txBody>
+      </p:sp>
+      <p:sp>
+        <p:nvSpPr>
+          <p:cNvPr id="29" name="Up-Down Arrow 28">
+            <a:extLst>
+              <a:ext uri="{FF2B5EF4-FFF2-40B4-BE49-F238E27FC236}">
+                <a16:creationId xmlns:a16="http://schemas.microsoft.com/office/drawing/2014/main" id="{647362CB-B95B-A148-9FAE-8C43EB32F5BD}"/>
+              </a:ext>
+            </a:extLst>
+          </p:cNvPr>
+          <p:cNvSpPr/>
+          <p:nvPr/>
+        </p:nvSpPr>
+        <p:spPr>
+          <a:xfrm>
+            <a:off x="4820582" y="1652686"/>
+            <a:ext cx="225096" cy="439724"/>
+          </a:xfrm>
+          <a:prstGeom prst="upDownArrow">
+            <a:avLst/>
+          </a:prstGeom>
+          <a:noFill/>
+          <a:ln>
+            <a:solidFill>
+              <a:schemeClr val="tx1"/>
+            </a:solidFill>
+          </a:ln>
+          <a:effectLst/>
+        </p:spPr>
+        <p:style>
+          <a:lnRef idx="1">
+            <a:schemeClr val="accent1"/>
+          </a:lnRef>
+          <a:fillRef idx="3">
+            <a:schemeClr val="accent1"/>
+          </a:fillRef>
+          <a:effectRef idx="2">
+            <a:schemeClr val="accent1"/>
+          </a:effectRef>
+          <a:fontRef idx="minor">
+            <a:schemeClr val="lt1"/>
+          </a:fontRef>
+        </p:style>
+        <p:txBody>
+          <a:bodyPr rtlCol="0" anchor="ctr"/>
+          <a:lstStyle/>
+          <a:p>
+            <a:pPr algn="ctr"/>
+            <a:endParaRPr lang="en-US" sz="1100">
+              <a:latin typeface="Times New Roman" panose="02020603050405020304" pitchFamily="18" charset="0"/>
+              <a:cs typeface="Times New Roman" panose="02020603050405020304" pitchFamily="18" charset="0"/>
+            </a:endParaRPr>
+          </a:p>
+        </p:txBody>
+      </p:sp>
+      <p:sp>
+        <p:nvSpPr>
+          <p:cNvPr id="31" name="TextBox 30">
+            <a:extLst>
+              <a:ext uri="{FF2B5EF4-FFF2-40B4-BE49-F238E27FC236}">
+                <a16:creationId xmlns:a16="http://schemas.microsoft.com/office/drawing/2014/main" id="{95BA8FBC-2770-9A40-9D44-D23B02E2EAC8}"/>
+              </a:ext>
+            </a:extLst>
+          </p:cNvPr>
+          <p:cNvSpPr txBox="1"/>
+          <p:nvPr/>
+        </p:nvSpPr>
+        <p:spPr>
+          <a:xfrm>
+            <a:off x="3805896" y="1748106"/>
+            <a:ext cx="580388" cy="261610"/>
+          </a:xfrm>
+          <a:prstGeom prst="rect">
+            <a:avLst/>
+          </a:prstGeom>
+          <a:noFill/>
+          <a:ln>
+            <a:noFill/>
+          </a:ln>
+        </p:spPr>
+        <p:txBody>
+          <a:bodyPr wrap="square" rtlCol="0" anchor="ctr" anchorCtr="0">
+            <a:spAutoFit/>
+          </a:bodyPr>
+          <a:lstStyle/>
+          <a:p>
+            <a:pPr algn="ctr"/>
+            <a:r>
+              <a:rPr lang="en-US" sz="1100" dirty="0" err="1">
+                <a:latin typeface="Times New Roman" panose="02020603050405020304" pitchFamily="18" charset="0"/>
+                <a:cs typeface="Times New Roman" panose="02020603050405020304" pitchFamily="18" charset="0"/>
+              </a:rPr>
+              <a:t>Alloc</a:t>
+            </a:r>
+            <a:endParaRPr lang="en-US" sz="1100" dirty="0">
+              <a:latin typeface="Times New Roman" panose="02020603050405020304" pitchFamily="18" charset="0"/>
+              <a:cs typeface="Times New Roman" panose="02020603050405020304" pitchFamily="18" charset="0"/>
+            </a:endParaRPr>
+          </a:p>
+        </p:txBody>
+      </p:sp>
+      <p:sp>
+        <p:nvSpPr>
+          <p:cNvPr id="33" name="TextBox 32">
+            <a:extLst>
+              <a:ext uri="{FF2B5EF4-FFF2-40B4-BE49-F238E27FC236}">
+                <a16:creationId xmlns:a16="http://schemas.microsoft.com/office/drawing/2014/main" id="{335FCED0-8603-D240-A217-264AC4080EA3}"/>
+              </a:ext>
+            </a:extLst>
+          </p:cNvPr>
+          <p:cNvSpPr txBox="1"/>
+          <p:nvPr/>
+        </p:nvSpPr>
+        <p:spPr>
+          <a:xfrm>
+            <a:off x="4443543" y="1748106"/>
+            <a:ext cx="580388" cy="261610"/>
+          </a:xfrm>
+          <a:prstGeom prst="rect">
+            <a:avLst/>
+          </a:prstGeom>
+          <a:noFill/>
+          <a:ln>
+            <a:noFill/>
+          </a:ln>
+        </p:spPr>
+        <p:txBody>
+          <a:bodyPr wrap="square" rtlCol="0" anchor="ctr" anchorCtr="0">
+            <a:spAutoFit/>
+          </a:bodyPr>
+          <a:lstStyle/>
+          <a:p>
+            <a:pPr algn="ctr"/>
+            <a:r>
+              <a:rPr lang="en-US" sz="1100" dirty="0">
+                <a:latin typeface="Times New Roman" panose="02020603050405020304" pitchFamily="18" charset="0"/>
+                <a:cs typeface="Times New Roman" panose="02020603050405020304" pitchFamily="18" charset="0"/>
+              </a:rPr>
+              <a:t>Free</a:t>
+            </a:r>
+          </a:p>
+        </p:txBody>
+      </p:sp>
+      <p:sp>
+        <p:nvSpPr>
+          <p:cNvPr id="35" name="Up-Down Arrow 34">
+            <a:extLst>
+              <a:ext uri="{FF2B5EF4-FFF2-40B4-BE49-F238E27FC236}">
+                <a16:creationId xmlns:a16="http://schemas.microsoft.com/office/drawing/2014/main" id="{90B4D13E-D699-4740-AB36-B27751D82C28}"/>
+              </a:ext>
+            </a:extLst>
+          </p:cNvPr>
+          <p:cNvSpPr/>
+          <p:nvPr/>
+        </p:nvSpPr>
+        <p:spPr>
+          <a:xfrm>
+            <a:off x="4256285" y="1644445"/>
+            <a:ext cx="225096" cy="439724"/>
+          </a:xfrm>
+          <a:prstGeom prst="upDownArrow">
+            <a:avLst/>
+          </a:prstGeom>
+          <a:noFill/>
+          <a:ln>
+            <a:solidFill>
+              <a:schemeClr val="tx1"/>
+            </a:solidFill>
+          </a:ln>
+          <a:effectLst/>
+        </p:spPr>
+        <p:style>
+          <a:lnRef idx="1">
+            <a:schemeClr val="accent1"/>
+          </a:lnRef>
+          <a:fillRef idx="3">
+            <a:schemeClr val="accent1"/>
+          </a:fillRef>
+          <a:effectRef idx="2">
+            <a:schemeClr val="accent1"/>
+          </a:effectRef>
+          <a:fontRef idx="minor">
+            <a:schemeClr val="lt1"/>
+          </a:fontRef>
+        </p:style>
+        <p:txBody>
+          <a:bodyPr rtlCol="0" anchor="ctr"/>
+          <a:lstStyle/>
+          <a:p>
+            <a:pPr algn="ctr"/>
+            <a:endParaRPr lang="en-US" sz="1100">
+              <a:latin typeface="Times New Roman" panose="02020603050405020304" pitchFamily="18" charset="0"/>
+              <a:cs typeface="Times New Roman" panose="02020603050405020304" pitchFamily="18" charset="0"/>
+            </a:endParaRPr>
+          </a:p>
+        </p:txBody>
+      </p:sp>
+      <p:sp>
+        <p:nvSpPr>
+          <p:cNvPr id="36" name="Rectangle 35">
+            <a:extLst>
+              <a:ext uri="{FF2B5EF4-FFF2-40B4-BE49-F238E27FC236}">
+                <a16:creationId xmlns:a16="http://schemas.microsoft.com/office/drawing/2014/main" id="{0DFC8C16-BDBD-6F4F-B756-353D64D42A59}"/>
+              </a:ext>
+            </a:extLst>
+          </p:cNvPr>
+          <p:cNvSpPr/>
+          <p:nvPr/>
+        </p:nvSpPr>
+        <p:spPr>
+          <a:xfrm>
+            <a:off x="4080858" y="2838280"/>
+            <a:ext cx="1097280" cy="265176"/>
+          </a:xfrm>
+          <a:prstGeom prst="rect">
+            <a:avLst/>
+          </a:prstGeom>
+          <a:noFill/>
+          <a:ln>
+            <a:solidFill>
+              <a:schemeClr val="tx1"/>
+            </a:solidFill>
+          </a:ln>
+          <a:effectLst/>
+        </p:spPr>
+        <p:style>
+          <a:lnRef idx="1">
+            <a:schemeClr val="accent1"/>
+          </a:lnRef>
+          <a:fillRef idx="3">
+            <a:schemeClr val="accent1"/>
+          </a:fillRef>
+          <a:effectRef idx="2">
+            <a:schemeClr val="accent1"/>
+          </a:effectRef>
+          <a:fontRef idx="minor">
+            <a:schemeClr val="lt1"/>
+          </a:fontRef>
+        </p:style>
+        <p:txBody>
+          <a:bodyPr rtlCol="0" anchor="ctr"/>
+          <a:lstStyle/>
+          <a:p>
+            <a:pPr algn="ctr"/>
+            <a:r>
+              <a:rPr lang="en-US" sz="1100" dirty="0">
+                <a:solidFill>
+                  <a:schemeClr val="tx1"/>
+                </a:solidFill>
+                <a:latin typeface="Times New Roman" panose="02020603050405020304" pitchFamily="18" charset="0"/>
+                <a:cs typeface="Times New Roman" panose="02020603050405020304" pitchFamily="18" charset="0"/>
+              </a:rPr>
+              <a:t>OS</a:t>
+            </a:r>
+          </a:p>
+        </p:txBody>
+      </p:sp>
+      <p:sp>
+        <p:nvSpPr>
+          <p:cNvPr id="37" name="TextBox 36">
+            <a:extLst>
+              <a:ext uri="{FF2B5EF4-FFF2-40B4-BE49-F238E27FC236}">
+                <a16:creationId xmlns:a16="http://schemas.microsoft.com/office/drawing/2014/main" id="{71A90939-93B2-4D43-8654-C410500A61D4}"/>
+              </a:ext>
+            </a:extLst>
+          </p:cNvPr>
+          <p:cNvSpPr txBox="1"/>
+          <p:nvPr/>
+        </p:nvSpPr>
+        <p:spPr>
+          <a:xfrm>
+            <a:off x="3907861" y="2408996"/>
+            <a:ext cx="729678" cy="430887"/>
+          </a:xfrm>
+          <a:prstGeom prst="rect">
+            <a:avLst/>
+          </a:prstGeom>
+          <a:noFill/>
+          <a:ln>
+            <a:noFill/>
+          </a:ln>
+        </p:spPr>
+        <p:txBody>
+          <a:bodyPr wrap="square" rtlCol="0" anchor="ctr" anchorCtr="0">
+            <a:spAutoFit/>
+          </a:bodyPr>
+          <a:lstStyle/>
+          <a:p>
+            <a:pPr algn="ctr"/>
+            <a:r>
+              <a:rPr lang="en-US" sz="1100" dirty="0">
+                <a:latin typeface="Times New Roman" panose="02020603050405020304" pitchFamily="18" charset="0"/>
+                <a:cs typeface="Times New Roman" panose="02020603050405020304" pitchFamily="18" charset="0"/>
+              </a:rPr>
+              <a:t>Memory</a:t>
+            </a:r>
+          </a:p>
+          <a:p>
+            <a:pPr algn="ctr"/>
+            <a:r>
+              <a:rPr lang="en-US" sz="1100" dirty="0" err="1">
+                <a:latin typeface="Times New Roman" panose="02020603050405020304" pitchFamily="18" charset="0"/>
+                <a:cs typeface="Times New Roman" panose="02020603050405020304" pitchFamily="18" charset="0"/>
+              </a:rPr>
+              <a:t>Syscalls</a:t>
+            </a:r>
+            <a:endParaRPr lang="en-US" sz="1100" dirty="0">
+              <a:latin typeface="Times New Roman" panose="02020603050405020304" pitchFamily="18" charset="0"/>
+              <a:cs typeface="Times New Roman" panose="02020603050405020304" pitchFamily="18" charset="0"/>
+            </a:endParaRPr>
+          </a:p>
+        </p:txBody>
+      </p:sp>
+      <p:sp>
+        <p:nvSpPr>
+          <p:cNvPr id="40" name="Up-Down Arrow 39">
+            <a:extLst>
+              <a:ext uri="{FF2B5EF4-FFF2-40B4-BE49-F238E27FC236}">
+                <a16:creationId xmlns:a16="http://schemas.microsoft.com/office/drawing/2014/main" id="{553C3CEA-4483-6B45-BF2F-364D43EC162B}"/>
+              </a:ext>
+            </a:extLst>
+          </p:cNvPr>
+          <p:cNvSpPr/>
+          <p:nvPr/>
+        </p:nvSpPr>
+        <p:spPr>
+          <a:xfrm>
+            <a:off x="4507540" y="2389973"/>
+            <a:ext cx="225096" cy="439724"/>
+          </a:xfrm>
+          <a:prstGeom prst="upDownArrow">
+            <a:avLst/>
+          </a:prstGeom>
+          <a:noFill/>
+          <a:ln>
+            <a:solidFill>
+              <a:schemeClr val="tx1"/>
+            </a:solidFill>
+          </a:ln>
+          <a:effectLst/>
+        </p:spPr>
+        <p:style>
+          <a:lnRef idx="1">
+            <a:schemeClr val="accent1"/>
+          </a:lnRef>
+          <a:fillRef idx="3">
+            <a:schemeClr val="accent1"/>
+          </a:fillRef>
+          <a:effectRef idx="2">
+            <a:schemeClr val="accent1"/>
+          </a:effectRef>
+          <a:fontRef idx="minor">
+            <a:schemeClr val="lt1"/>
+          </a:fontRef>
+        </p:style>
+        <p:txBody>
+          <a:bodyPr rtlCol="0" anchor="ctr"/>
+          <a:lstStyle/>
+          <a:p>
+            <a:pPr algn="ctr"/>
+            <a:endParaRPr lang="en-US" sz="1100">
+              <a:latin typeface="Times New Roman" panose="02020603050405020304" pitchFamily="18" charset="0"/>
+              <a:cs typeface="Times New Roman" panose="02020603050405020304" pitchFamily="18" charset="0"/>
+            </a:endParaRPr>
+          </a:p>
+        </p:txBody>
+      </p:sp>
+      <p:sp>
+        <p:nvSpPr>
+          <p:cNvPr id="41" name="Rectangle 40">
+            <a:extLst>
+              <a:ext uri="{FF2B5EF4-FFF2-40B4-BE49-F238E27FC236}">
+                <a16:creationId xmlns:a16="http://schemas.microsoft.com/office/drawing/2014/main" id="{B114E6CA-5E1D-6242-87F8-D48886002356}"/>
+              </a:ext>
+            </a:extLst>
+          </p:cNvPr>
+          <p:cNvSpPr/>
+          <p:nvPr/>
+        </p:nvSpPr>
+        <p:spPr>
+          <a:xfrm>
+            <a:off x="5637290" y="2124797"/>
+            <a:ext cx="1097280" cy="265176"/>
+          </a:xfrm>
+          <a:prstGeom prst="rect">
+            <a:avLst/>
+          </a:prstGeom>
+          <a:noFill/>
+          <a:ln>
+            <a:solidFill>
+              <a:schemeClr val="tx1"/>
+            </a:solidFill>
+          </a:ln>
+          <a:effectLst/>
+        </p:spPr>
+        <p:style>
+          <a:lnRef idx="1">
+            <a:schemeClr val="accent1"/>
+          </a:lnRef>
+          <a:fillRef idx="3">
+            <a:schemeClr val="accent1"/>
+          </a:fillRef>
+          <a:effectRef idx="2">
+            <a:schemeClr val="accent1"/>
+          </a:effectRef>
+          <a:fontRef idx="minor">
+            <a:schemeClr val="lt1"/>
+          </a:fontRef>
+        </p:style>
+        <p:txBody>
+          <a:bodyPr rtlCol="0" anchor="ctr"/>
+          <a:lstStyle/>
+          <a:p>
+            <a:pPr algn="ctr"/>
+            <a:r>
+              <a:rPr lang="en-US" sz="1100" dirty="0" err="1">
+                <a:solidFill>
+                  <a:schemeClr val="tx1"/>
+                </a:solidFill>
+                <a:latin typeface="Times New Roman" panose="02020603050405020304" pitchFamily="18" charset="0"/>
+                <a:cs typeface="Times New Roman" panose="02020603050405020304" pitchFamily="18" charset="0"/>
+              </a:rPr>
+              <a:t>Pthreads</a:t>
+            </a:r>
+            <a:r>
+              <a:rPr lang="en-US" sz="1100" dirty="0">
+                <a:solidFill>
+                  <a:schemeClr val="tx1"/>
+                </a:solidFill>
+                <a:latin typeface="Times New Roman" panose="02020603050405020304" pitchFamily="18" charset="0"/>
+                <a:cs typeface="Times New Roman" panose="02020603050405020304" pitchFamily="18" charset="0"/>
+              </a:rPr>
+              <a:t> Lib</a:t>
+            </a:r>
+          </a:p>
+        </p:txBody>
+      </p:sp>
+      <p:sp>
+        <p:nvSpPr>
+          <p:cNvPr id="42" name="Up-Down Arrow 41">
+            <a:extLst>
+              <a:ext uri="{FF2B5EF4-FFF2-40B4-BE49-F238E27FC236}">
+                <a16:creationId xmlns:a16="http://schemas.microsoft.com/office/drawing/2014/main" id="{B5A74ED9-A39D-7E49-B328-22B2FC63E46E}"/>
+              </a:ext>
+            </a:extLst>
+          </p:cNvPr>
+          <p:cNvSpPr/>
+          <p:nvPr/>
+        </p:nvSpPr>
+        <p:spPr>
+          <a:xfrm rot="5400000">
+            <a:off x="5293617" y="2037523"/>
+            <a:ext cx="225096" cy="439724"/>
+          </a:xfrm>
+          <a:prstGeom prst="upDownArrow">
+            <a:avLst/>
+          </a:prstGeom>
+          <a:noFill/>
+          <a:ln>
+            <a:solidFill>
+              <a:schemeClr val="tx1"/>
+            </a:solidFill>
+          </a:ln>
+          <a:effectLst/>
+        </p:spPr>
+        <p:style>
+          <a:lnRef idx="1">
+            <a:schemeClr val="accent1"/>
+          </a:lnRef>
+          <a:fillRef idx="3">
+            <a:schemeClr val="accent1"/>
+          </a:fillRef>
+          <a:effectRef idx="2">
+            <a:schemeClr val="accent1"/>
+          </a:effectRef>
+          <a:fontRef idx="minor">
+            <a:schemeClr val="lt1"/>
+          </a:fontRef>
+        </p:style>
+        <p:txBody>
+          <a:bodyPr rtlCol="0" anchor="ctr"/>
+          <a:lstStyle/>
+          <a:p>
+            <a:pPr algn="ctr"/>
+            <a:endParaRPr lang="en-US" sz="1100">
+              <a:latin typeface="Times New Roman" panose="02020603050405020304" pitchFamily="18" charset="0"/>
+              <a:cs typeface="Times New Roman" panose="02020603050405020304" pitchFamily="18" charset="0"/>
+            </a:endParaRPr>
+          </a:p>
+        </p:txBody>
+      </p:sp>
+      <p:sp>
+        <p:nvSpPr>
+          <p:cNvPr id="43" name="TextBox 42">
+            <a:extLst>
+              <a:ext uri="{FF2B5EF4-FFF2-40B4-BE49-F238E27FC236}">
+                <a16:creationId xmlns:a16="http://schemas.microsoft.com/office/drawing/2014/main" id="{D6775463-B727-A344-A609-DE26B877AEC9}"/>
+              </a:ext>
+            </a:extLst>
+          </p:cNvPr>
+          <p:cNvSpPr txBox="1"/>
+          <p:nvPr/>
+        </p:nvSpPr>
+        <p:spPr>
+          <a:xfrm>
+            <a:off x="5144113" y="1951368"/>
+            <a:ext cx="580388" cy="261610"/>
+          </a:xfrm>
+          <a:prstGeom prst="rect">
+            <a:avLst/>
+          </a:prstGeom>
+          <a:noFill/>
+          <a:ln>
+            <a:noFill/>
+          </a:ln>
+        </p:spPr>
+        <p:txBody>
+          <a:bodyPr wrap="square" rtlCol="0" anchor="ctr" anchorCtr="0">
+            <a:spAutoFit/>
+          </a:bodyPr>
+          <a:lstStyle/>
+          <a:p>
+            <a:pPr algn="ctr"/>
+            <a:r>
+              <a:rPr lang="en-US" sz="1100" dirty="0">
+                <a:latin typeface="Times New Roman" panose="02020603050405020304" pitchFamily="18" charset="0"/>
+                <a:cs typeface="Times New Roman" panose="02020603050405020304" pitchFamily="18" charset="0"/>
+              </a:rPr>
+              <a:t>Syncs</a:t>
+            </a:r>
+          </a:p>
+        </p:txBody>
+      </p:sp>
+      <p:sp>
+        <p:nvSpPr>
+          <p:cNvPr id="2" name="Oval 1">
+            <a:extLst>
+              <a:ext uri="{FF2B5EF4-FFF2-40B4-BE49-F238E27FC236}">
+                <a16:creationId xmlns:a16="http://schemas.microsoft.com/office/drawing/2014/main" id="{779F51BA-883B-0F49-A0AC-0BCB869EAC4E}"/>
+              </a:ext>
+            </a:extLst>
+          </p:cNvPr>
+          <p:cNvSpPr/>
+          <p:nvPr/>
+        </p:nvSpPr>
+        <p:spPr>
+          <a:xfrm>
+            <a:off x="3767099" y="1878458"/>
+            <a:ext cx="1661900" cy="745677"/>
+          </a:xfrm>
+          <a:prstGeom prst="ellipse">
+            <a:avLst/>
+          </a:prstGeom>
+          <a:noFill/>
+          <a:ln w="19050">
+            <a:solidFill>
+              <a:schemeClr val="tx1"/>
+            </a:solidFill>
+            <a:prstDash val="dash"/>
+          </a:ln>
+          <a:effectLst/>
+        </p:spPr>
+        <p:style>
+          <a:lnRef idx="1">
+            <a:schemeClr val="accent1"/>
+          </a:lnRef>
+          <a:fillRef idx="3">
+            <a:schemeClr val="accent1"/>
+          </a:fillRef>
+          <a:effectRef idx="2">
+            <a:schemeClr val="accent1"/>
+          </a:effectRef>
+          <a:fontRef idx="minor">
+            <a:schemeClr val="lt1"/>
+          </a:fontRef>
+        </p:style>
+        <p:txBody>
+          <a:bodyPr rtlCol="0" anchor="ctr"/>
+          <a:lstStyle/>
+          <a:p>
+            <a:pPr algn="ctr"/>
+            <a:endParaRPr lang="en-US"/>
+          </a:p>
+        </p:txBody>
+      </p:sp>
+      <p:sp>
+        <p:nvSpPr>
+          <p:cNvPr id="44" name="TextBox 43">
+            <a:extLst>
+              <a:ext uri="{FF2B5EF4-FFF2-40B4-BE49-F238E27FC236}">
+                <a16:creationId xmlns:a16="http://schemas.microsoft.com/office/drawing/2014/main" id="{AD11488F-0D98-A543-809D-B21560339ECE}"/>
+              </a:ext>
+            </a:extLst>
+          </p:cNvPr>
+          <p:cNvSpPr txBox="1"/>
+          <p:nvPr/>
+        </p:nvSpPr>
+        <p:spPr>
+          <a:xfrm>
+            <a:off x="2030044" y="2310090"/>
+            <a:ext cx="958844" cy="261610"/>
+          </a:xfrm>
+          <a:prstGeom prst="rect">
+            <a:avLst/>
+          </a:prstGeom>
+          <a:noFill/>
+          <a:ln>
+            <a:noFill/>
+          </a:ln>
+        </p:spPr>
+        <p:txBody>
+          <a:bodyPr wrap="square" rtlCol="0" anchor="ctr" anchorCtr="0">
+            <a:spAutoFit/>
+          </a:bodyPr>
+          <a:lstStyle/>
+          <a:p>
+            <a:pPr algn="ctr"/>
+            <a:r>
+              <a:rPr lang="en-US" sz="1100" dirty="0" err="1">
+                <a:latin typeface="Times New Roman" panose="02020603050405020304" pitchFamily="18" charset="0"/>
+                <a:cs typeface="Times New Roman" panose="02020603050405020304" pitchFamily="18" charset="0"/>
+              </a:rPr>
+              <a:t>Mmprof</a:t>
+            </a:r>
+            <a:endParaRPr lang="en-US" sz="2000" dirty="0">
+              <a:latin typeface="Times New Roman" panose="02020603050405020304" pitchFamily="18" charset="0"/>
+              <a:cs typeface="Times New Roman" panose="02020603050405020304" pitchFamily="18" charset="0"/>
+            </a:endParaRPr>
+          </a:p>
+        </p:txBody>
+      </p:sp>
+      <p:sp>
+        <p:nvSpPr>
+          <p:cNvPr id="45" name="TextBox 44">
+            <a:extLst>
+              <a:ext uri="{FF2B5EF4-FFF2-40B4-BE49-F238E27FC236}">
+                <a16:creationId xmlns:a16="http://schemas.microsoft.com/office/drawing/2014/main" id="{8802DE8D-51F4-2449-923C-833A1F1546F7}"/>
+              </a:ext>
+            </a:extLst>
+          </p:cNvPr>
+          <p:cNvSpPr txBox="1"/>
+          <p:nvPr/>
+        </p:nvSpPr>
+        <p:spPr>
+          <a:xfrm>
+            <a:off x="2894209" y="2117293"/>
+            <a:ext cx="958844" cy="261610"/>
+          </a:xfrm>
+          <a:prstGeom prst="rect">
+            <a:avLst/>
+          </a:prstGeom>
+          <a:noFill/>
+          <a:ln>
+            <a:noFill/>
+          </a:ln>
+        </p:spPr>
+        <p:txBody>
+          <a:bodyPr wrap="square" rtlCol="0" anchor="ctr" anchorCtr="0">
+            <a:spAutoFit/>
+          </a:bodyPr>
+          <a:lstStyle/>
+          <a:p>
+            <a:pPr algn="ctr"/>
+            <a:r>
+              <a:rPr lang="en-US" sz="1100" dirty="0">
+                <a:latin typeface="Times New Roman" panose="02020603050405020304" pitchFamily="18" charset="0"/>
+                <a:cs typeface="Times New Roman" panose="02020603050405020304" pitchFamily="18" charset="0"/>
+              </a:rPr>
+              <a:t>Interception</a:t>
+            </a:r>
+          </a:p>
+        </p:txBody>
+      </p:sp>
+      <p:sp>
+        <p:nvSpPr>
+          <p:cNvPr id="46" name="TextBox 45">
+            <a:extLst>
+              <a:ext uri="{FF2B5EF4-FFF2-40B4-BE49-F238E27FC236}">
+                <a16:creationId xmlns:a16="http://schemas.microsoft.com/office/drawing/2014/main" id="{96B94D0A-5F4C-2740-B0C1-28DED080F37F}"/>
+              </a:ext>
+            </a:extLst>
+          </p:cNvPr>
+          <p:cNvSpPr txBox="1"/>
+          <p:nvPr/>
+        </p:nvSpPr>
+        <p:spPr>
+          <a:xfrm>
+            <a:off x="2894209" y="2276750"/>
+            <a:ext cx="958844" cy="400110"/>
+          </a:xfrm>
+          <a:prstGeom prst="rect">
+            <a:avLst/>
+          </a:prstGeom>
+          <a:noFill/>
+          <a:ln>
+            <a:noFill/>
+          </a:ln>
+        </p:spPr>
+        <p:txBody>
+          <a:bodyPr wrap="square" rtlCol="0" anchor="ctr" anchorCtr="0">
+            <a:spAutoFit/>
+          </a:bodyPr>
+          <a:lstStyle/>
+          <a:p>
+            <a:pPr algn="ctr"/>
+            <a:r>
+              <a:rPr lang="en-US" sz="2000" dirty="0">
+                <a:latin typeface="Times New Roman" panose="02020603050405020304" pitchFamily="18" charset="0"/>
+                <a:cs typeface="Times New Roman" panose="02020603050405020304" pitchFamily="18" charset="0"/>
+              </a:rPr>
+              <a:t>+</a:t>
+            </a:r>
+          </a:p>
+        </p:txBody>
+      </p:sp>
+      <p:sp>
+        <p:nvSpPr>
+          <p:cNvPr id="47" name="TextBox 46">
+            <a:extLst>
+              <a:ext uri="{FF2B5EF4-FFF2-40B4-BE49-F238E27FC236}">
+                <a16:creationId xmlns:a16="http://schemas.microsoft.com/office/drawing/2014/main" id="{D610ABD7-344A-7144-A603-5FD8A45A2CB3}"/>
+              </a:ext>
+            </a:extLst>
+          </p:cNvPr>
+          <p:cNvSpPr txBox="1"/>
+          <p:nvPr/>
+        </p:nvSpPr>
+        <p:spPr>
+          <a:xfrm>
+            <a:off x="2413262" y="2240840"/>
+            <a:ext cx="958844" cy="400110"/>
+          </a:xfrm>
+          <a:prstGeom prst="rect">
+            <a:avLst/>
+          </a:prstGeom>
+          <a:noFill/>
+          <a:ln>
+            <a:noFill/>
+          </a:ln>
+        </p:spPr>
+        <p:txBody>
+          <a:bodyPr wrap="square" rtlCol="0" anchor="ctr" anchorCtr="0">
+            <a:spAutoFit/>
+          </a:bodyPr>
+          <a:lstStyle/>
+          <a:p>
+            <a:pPr algn="ctr"/>
+            <a:r>
+              <a:rPr lang="en-US" sz="2000" dirty="0">
+                <a:latin typeface="Times New Roman" panose="02020603050405020304" pitchFamily="18" charset="0"/>
+                <a:cs typeface="Times New Roman" panose="02020603050405020304" pitchFamily="18" charset="0"/>
+              </a:rPr>
+              <a:t>=</a:t>
+            </a:r>
+          </a:p>
+        </p:txBody>
+      </p:sp>
+      <p:sp>
+        <p:nvSpPr>
+          <p:cNvPr id="48" name="TextBox 47">
+            <a:extLst>
+              <a:ext uri="{FF2B5EF4-FFF2-40B4-BE49-F238E27FC236}">
+                <a16:creationId xmlns:a16="http://schemas.microsoft.com/office/drawing/2014/main" id="{7BC1F02F-D303-C442-8BF7-0803A1F31A46}"/>
+              </a:ext>
+            </a:extLst>
+          </p:cNvPr>
+          <p:cNvSpPr txBox="1"/>
+          <p:nvPr/>
+        </p:nvSpPr>
+        <p:spPr>
+          <a:xfrm>
+            <a:off x="2898325" y="2566255"/>
+            <a:ext cx="958844" cy="261610"/>
+          </a:xfrm>
+          <a:prstGeom prst="rect">
+            <a:avLst/>
+          </a:prstGeom>
+          <a:noFill/>
+          <a:ln>
+            <a:noFill/>
+          </a:ln>
+        </p:spPr>
+        <p:txBody>
+          <a:bodyPr wrap="square" rtlCol="0" anchor="ctr" anchorCtr="0">
+            <a:spAutoFit/>
+          </a:bodyPr>
+          <a:lstStyle/>
+          <a:p>
+            <a:pPr algn="ctr"/>
+            <a:r>
+              <a:rPr lang="en-US" sz="1100" dirty="0">
+                <a:latin typeface="Times New Roman" panose="02020603050405020304" pitchFamily="18" charset="0"/>
+                <a:cs typeface="Times New Roman" panose="02020603050405020304" pitchFamily="18" charset="0"/>
+              </a:rPr>
+              <a:t>PMUs</a:t>
+            </a:r>
+          </a:p>
+        </p:txBody>
+      </p:sp>
+    </p:spTree>
+    <p:extLst>
+      <p:ext uri="{BB962C8B-B14F-4D97-AF65-F5344CB8AC3E}">
+        <p14:creationId xmlns:p14="http://schemas.microsoft.com/office/powerpoint/2010/main" val="4176759323"/>
+      </p:ext>
+    </p:extLst>
+  </p:cSld>
+  <p:clrMapOvr>
+    <a:masterClrMapping/>
+  </p:clrMapOvr>
+</p:sld>
+</file>
+
+<file path=ppt/slides/slide17.xml><?xml version="1.0" encoding="utf-8"?>
+<p:sld xmlns:a="http://schemas.openxmlformats.org/drawingml/2006/main" xmlns:r="http://schemas.openxmlformats.org/officeDocument/2006/relationships" xmlns:p="http://schemas.openxmlformats.org/presentationml/2006/main">
+  <p:cSld>
+    <p:spTree>
+      <p:nvGrpSpPr>
+        <p:cNvPr id="1" name=""/>
+        <p:cNvGrpSpPr/>
+        <p:nvPr/>
+      </p:nvGrpSpPr>
+      <p:grpSpPr>
+        <a:xfrm>
+          <a:off x="0" y="0"/>
+          <a:ext cx="0" cy="0"/>
+          <a:chOff x="0" y="0"/>
+          <a:chExt cx="0" cy="0"/>
+        </a:xfrm>
+      </p:grpSpPr>
+      <p:sp>
+        <p:nvSpPr>
+          <p:cNvPr id="2" name="Title 1">
+            <a:extLst>
+              <a:ext uri="{FF2B5EF4-FFF2-40B4-BE49-F238E27FC236}">
+                <a16:creationId xmlns:a16="http://schemas.microsoft.com/office/drawing/2014/main" id="{34B451E6-15A9-5849-8A71-579D321E27E4}"/>
+              </a:ext>
+            </a:extLst>
+          </p:cNvPr>
+          <p:cNvSpPr>
+            <a:spLocks noGrp="1"/>
+          </p:cNvSpPr>
+          <p:nvPr>
+            <p:ph type="title"/>
+          </p:nvPr>
+        </p:nvSpPr>
+        <p:spPr/>
+        <p:txBody>
+          <a:bodyPr/>
+          <a:lstStyle/>
+          <a:p>
+            <a:endParaRPr lang="en-US"/>
+          </a:p>
+        </p:txBody>
+      </p:sp>
+      <p:sp>
+        <p:nvSpPr>
+          <p:cNvPr id="3" name="Content Placeholder 2">
+            <a:extLst>
+              <a:ext uri="{FF2B5EF4-FFF2-40B4-BE49-F238E27FC236}">
+                <a16:creationId xmlns:a16="http://schemas.microsoft.com/office/drawing/2014/main" id="{7C38C0DB-4369-9A4A-A24A-5707A0061F8C}"/>
+              </a:ext>
+            </a:extLst>
+          </p:cNvPr>
+          <p:cNvSpPr>
+            <a:spLocks noGrp="1"/>
+          </p:cNvSpPr>
+          <p:nvPr>
+            <p:ph idx="1"/>
+          </p:nvPr>
+        </p:nvSpPr>
+        <p:spPr/>
+        <p:txBody>
+          <a:bodyPr/>
+          <a:lstStyle/>
+          <a:p>
+            <a:endParaRPr lang="en-US"/>
+          </a:p>
+        </p:txBody>
+      </p:sp>
+    </p:spTree>
+    <p:extLst>
+      <p:ext uri="{BB962C8B-B14F-4D97-AF65-F5344CB8AC3E}">
+        <p14:creationId xmlns:p14="http://schemas.microsoft.com/office/powerpoint/2010/main" val="1890839423"/>
+      </p:ext>
+    </p:extLst>
+  </p:cSld>
+  <p:clrMapOvr>
+    <a:masterClrMapping/>
+  </p:clrMapOvr>
+</p:sld>
+</file>
+
+<file path=ppt/slides/slide18.xml><?xml version="1.0" encoding="utf-8"?>
+<p:sld xmlns:a="http://schemas.openxmlformats.org/drawingml/2006/main" xmlns:r="http://schemas.openxmlformats.org/officeDocument/2006/relationships" xmlns:p="http://schemas.openxmlformats.org/presentationml/2006/main">
+  <p:cSld>
+    <p:spTree>
+      <p:nvGrpSpPr>
+        <p:cNvPr id="1" name=""/>
+        <p:cNvGrpSpPr/>
+        <p:nvPr/>
+      </p:nvGrpSpPr>
+      <p:grpSpPr>
+        <a:xfrm>
+          <a:off x="0" y="0"/>
+          <a:ext cx="0" cy="0"/>
+          <a:chOff x="0" y="0"/>
+          <a:chExt cx="0" cy="0"/>
+        </a:xfrm>
+      </p:grpSpPr>
+      <p:sp>
+        <p:nvSpPr>
           <p:cNvPr id="2" name="Title 1"/>
           <p:cNvSpPr>
             <a:spLocks noGrp="1"/>
@@ -3844,10 +6172,9 @@
           <a:lstStyle/>
           <a:p>
             <a:r>
-              <a:rPr lang="en-US" dirty="0" smtClean="0"/>
+              <a:rPr lang="en-US" dirty="0"/>
               <a:t>Contributions</a:t>
             </a:r>
-            <a:endParaRPr lang="en-US" dirty="0"/>
           </a:p>
         </p:txBody>
       </p:sp>
@@ -3869,22 +6196,21 @@
           <a:lstStyle/>
           <a:p>
             <a:r>
-              <a:rPr lang="en-US" dirty="0" smtClean="0"/>
+              <a:rPr lang="en-US" dirty="0"/>
               <a:t>Introduce a general profiler that focuses only on profiling allocators themselves, which will be good for developers of allocators and architects of considering different allocators. No need to change the specific allocator’s design to collect data.</a:t>
             </a:r>
           </a:p>
           <a:p>
             <a:r>
-              <a:rPr lang="en-US" dirty="0" smtClean="0"/>
+              <a:rPr lang="en-US" dirty="0"/>
               <a:t>Proposes multiple methods/concepts to evaluate the allocators themselves. </a:t>
             </a:r>
           </a:p>
           <a:p>
             <a:r>
-              <a:rPr lang="en-US" dirty="0" smtClean="0"/>
+              <a:rPr lang="en-US" dirty="0"/>
               <a:t>Experimentally evaluated multiple general allocators and secure allocators, comparing their pros and cons based on our metrics</a:t>
             </a:r>
-            <a:endParaRPr lang="en-US" dirty="0"/>
           </a:p>
         </p:txBody>
       </p:sp>
@@ -3898,13 +6224,6 @@
   <p:clrMapOvr>
     <a:masterClrMapping/>
   </p:clrMapOvr>
-  <p:timing>
-    <p:tnLst>
-      <p:par>
-        <p:cTn xmlns:p14="http://schemas.microsoft.com/office/powerpoint/2010/main" id="1" dur="indefinite" restart="never" nodeType="tmRoot"/>
-      </p:par>
-    </p:tnLst>
-  </p:timing>
 </p:sld>
 </file>
 
@@ -3941,10 +6260,9 @@
           <a:lstStyle/>
           <a:p>
             <a:r>
-              <a:rPr lang="en-US" dirty="0" smtClean="0"/>
+              <a:rPr lang="en-US" dirty="0"/>
               <a:t>Overall Target</a:t>
             </a:r>
-            <a:endParaRPr lang="en-US" dirty="0"/>
           </a:p>
         </p:txBody>
       </p:sp>
@@ -3964,35 +6282,35 @@
           <a:lstStyle/>
           <a:p>
             <a:r>
-              <a:rPr lang="en-US" dirty="0" smtClean="0"/>
+              <a:rPr lang="en-US" dirty="0"/>
               <a:t>Understanding why an allocator performs well or badly</a:t>
             </a:r>
           </a:p>
           <a:p>
             <a:pPr lvl="1"/>
             <a:r>
-              <a:rPr lang="en-US" dirty="0" smtClean="0"/>
+              <a:rPr lang="en-US" dirty="0"/>
               <a:t>Performance</a:t>
             </a:r>
           </a:p>
           <a:p>
             <a:pPr lvl="1"/>
             <a:r>
-              <a:rPr lang="en-US" dirty="0" smtClean="0"/>
+              <a:rPr lang="en-US" dirty="0"/>
               <a:t>Memory</a:t>
             </a:r>
           </a:p>
           <a:p>
             <a:pPr lvl="1"/>
             <a:r>
-              <a:rPr lang="en-US" dirty="0" smtClean="0"/>
+              <a:rPr lang="en-US" dirty="0"/>
               <a:t>Scalability</a:t>
             </a:r>
           </a:p>
           <a:p>
             <a:pPr lvl="1"/>
             <a:r>
-              <a:rPr lang="en-US" dirty="0" smtClean="0"/>
+              <a:rPr lang="en-US" dirty="0"/>
               <a:t>Application Friendliness</a:t>
             </a:r>
           </a:p>
@@ -4000,7 +6318,7 @@
             <a:pPr marL="457200" lvl="1" indent="0">
               <a:buNone/>
             </a:pPr>
-            <a:endParaRPr lang="en-US" dirty="0" smtClean="0"/>
+            <a:endParaRPr lang="en-US" dirty="0"/>
           </a:p>
           <a:p>
             <a:endParaRPr lang="en-US" dirty="0"/>
@@ -4017,13 +6335,6 @@
   <p:clrMapOvr>
     <a:masterClrMapping/>
   </p:clrMapOvr>
-  <p:timing>
-    <p:tnLst>
-      <p:par>
-        <p:cTn xmlns:p14="http://schemas.microsoft.com/office/powerpoint/2010/main" id="1" dur="indefinite" restart="never" nodeType="tmRoot"/>
-      </p:par>
-    </p:tnLst>
-  </p:timing>
 </p:sld>
 </file>
 
@@ -4062,11 +6373,11 @@
           <a:lstStyle/>
           <a:p>
             <a:r>
-              <a:rPr lang="en-US" sz="3200" dirty="0" smtClean="0"/>
+              <a:rPr lang="en-US" sz="3200" dirty="0"/>
               <a:t>Performance of Allocations and </a:t>
             </a:r>
             <a:r>
-              <a:rPr lang="en-US" sz="3200" dirty="0" err="1" smtClean="0"/>
+              <a:rPr lang="en-US" sz="3200" dirty="0" err="1"/>
               <a:t>Deallocations</a:t>
             </a:r>
             <a:endParaRPr lang="en-US" sz="3200" dirty="0"/>
@@ -4094,67 +6405,67 @@
           <a:lstStyle/>
           <a:p>
             <a:r>
-              <a:rPr lang="en-US" dirty="0" smtClean="0"/>
+              <a:rPr lang="en-US" dirty="0"/>
               <a:t>Performance of per-allocation or per-</a:t>
             </a:r>
             <a:r>
-              <a:rPr lang="en-US" dirty="0" err="1" smtClean="0"/>
+              <a:rPr lang="en-US" dirty="0" err="1"/>
               <a:t>deallocation</a:t>
             </a:r>
             <a:r>
-              <a:rPr lang="en-US" dirty="0" smtClean="0"/>
+              <a:rPr lang="en-US" dirty="0"/>
               <a:t>? </a:t>
             </a:r>
           </a:p>
           <a:p>
             <a:pPr lvl="1"/>
             <a:r>
-              <a:rPr lang="en-US" dirty="0" smtClean="0"/>
+              <a:rPr lang="en-US" dirty="0"/>
               <a:t>Time spent: RTDSC timestamp</a:t>
             </a:r>
           </a:p>
           <a:p>
             <a:pPr lvl="1"/>
             <a:r>
-              <a:rPr lang="en-US" dirty="0" smtClean="0"/>
+              <a:rPr lang="en-US" dirty="0"/>
               <a:t>Instructions inside on average: PMU</a:t>
             </a:r>
           </a:p>
           <a:p>
             <a:pPr lvl="1"/>
             <a:r>
-              <a:rPr lang="en-US" dirty="0" smtClean="0"/>
+              <a:rPr lang="en-US" dirty="0"/>
               <a:t>Cache misses: PMU</a:t>
             </a:r>
           </a:p>
           <a:p>
             <a:pPr lvl="1"/>
             <a:r>
-              <a:rPr lang="en-US" dirty="0" smtClean="0"/>
+              <a:rPr lang="en-US" dirty="0"/>
               <a:t>TLB misses: PMU</a:t>
             </a:r>
           </a:p>
           <a:p>
             <a:pPr lvl="1"/>
             <a:r>
-              <a:rPr lang="en-US" dirty="0" smtClean="0"/>
+              <a:rPr lang="en-US" dirty="0"/>
               <a:t>Contention: see scalability</a:t>
             </a:r>
           </a:p>
           <a:p>
             <a:pPr lvl="1"/>
-            <a:endParaRPr lang="en-US" dirty="0" smtClean="0"/>
+            <a:endParaRPr lang="en-US" dirty="0"/>
           </a:p>
           <a:p>
             <a:pPr lvl="1"/>
-            <a:endParaRPr lang="en-US" dirty="0" smtClean="0"/>
+            <a:endParaRPr lang="en-US" dirty="0"/>
           </a:p>
           <a:p>
             <a:pPr lvl="1"/>
-            <a:endParaRPr lang="en-US" dirty="0" smtClean="0"/>
-          </a:p>
-          <a:p>
-            <a:endParaRPr lang="en-US" dirty="0" smtClean="0"/>
+            <a:endParaRPr lang="en-US" dirty="0"/>
+          </a:p>
+          <a:p>
+            <a:endParaRPr lang="en-US" dirty="0"/>
           </a:p>
           <a:p>
             <a:endParaRPr lang="en-US" dirty="0"/>
@@ -4184,25 +6495,21 @@
           <a:lstStyle/>
           <a:p>
             <a:r>
-              <a:rPr lang="en-US" dirty="0" smtClean="0"/>
+              <a:rPr lang="en-US" dirty="0"/>
               <a:t>It is possible that time is significant, but with not many instructions. However, cache misses</a:t>
             </a:r>
           </a:p>
           <a:p>
             <a:r>
               <a:rPr lang="en-US" dirty="0"/>
-              <a:t>a</a:t>
-            </a:r>
-            <a:r>
-              <a:rPr lang="en-US" dirty="0" smtClean="0"/>
-              <a:t>nd page faults can be quite large, such as </a:t>
-            </a:r>
-            <a:r>
-              <a:rPr lang="en-US" dirty="0" err="1" smtClean="0"/>
+              <a:t>and page faults can be quite large, such as </a:t>
+            </a:r>
+            <a:r>
+              <a:rPr lang="en-US" dirty="0" err="1"/>
               <a:t>DieHarder</a:t>
             </a:r>
             <a:r>
-              <a:rPr lang="en-US" dirty="0" smtClean="0"/>
+              <a:rPr lang="en-US" dirty="0"/>
               <a:t>. </a:t>
             </a:r>
           </a:p>
@@ -4212,17 +6519,16 @@
               <a:buChar char="•"/>
             </a:pPr>
             <a:r>
-              <a:rPr lang="en-US" dirty="0" smtClean="0"/>
+              <a:rPr lang="en-US" dirty="0"/>
               <a:t>We may consider time-per-instruction. If it is high, then other reasons such as cache </a:t>
             </a:r>
           </a:p>
           <a:p>
             <a:pPr lvl="1"/>
             <a:r>
-              <a:rPr lang="en-US" dirty="0" smtClean="0"/>
+              <a:rPr lang="en-US" dirty="0"/>
               <a:t>or page faults, or contention may play an important role. </a:t>
             </a:r>
-            <a:endParaRPr lang="en-US" dirty="0"/>
           </a:p>
         </p:txBody>
       </p:sp>
@@ -4236,13 +6542,6 @@
   <p:clrMapOvr>
     <a:masterClrMapping/>
   </p:clrMapOvr>
-  <p:timing>
-    <p:tnLst>
-      <p:par>
-        <p:cTn xmlns:p14="http://schemas.microsoft.com/office/powerpoint/2010/main" id="1" dur="indefinite" restart="never" nodeType="tmRoot"/>
-      </p:par>
-    </p:tnLst>
-  </p:timing>
 </p:sld>
 </file>
 
@@ -4279,10 +6578,9 @@
           <a:lstStyle/>
           <a:p>
             <a:r>
-              <a:rPr lang="en-US" dirty="0" smtClean="0"/>
+              <a:rPr lang="en-US" dirty="0"/>
               <a:t>Memory Overhead</a:t>
             </a:r>
-            <a:endParaRPr lang="en-US" dirty="0"/>
           </a:p>
         </p:txBody>
       </p:sp>
@@ -4309,7 +6607,7 @@
           <a:lstStyle/>
           <a:p>
             <a:r>
-              <a:rPr lang="en-US" dirty="0" smtClean="0"/>
+              <a:rPr lang="en-US" dirty="0"/>
               <a:t>Metadata Overhead</a:t>
             </a:r>
           </a:p>
@@ -4318,7 +6616,7 @@
           </a:p>
           <a:p>
             <a:r>
-              <a:rPr lang="en-US" dirty="0" smtClean="0"/>
+              <a:rPr lang="en-US" dirty="0"/>
               <a:t>Memory Blowup</a:t>
             </a:r>
           </a:p>
@@ -4326,42 +6624,26 @@
             <a:pPr lvl="1"/>
             <a:r>
               <a:rPr lang="en-US" dirty="0"/>
-              <a:t>blowup is the increase in memory consumption </a:t>
-            </a:r>
-            <a:r>
-              <a:rPr lang="en-US" dirty="0" smtClean="0"/>
-              <a:t>caused when </a:t>
-            </a:r>
-            <a:r>
-              <a:rPr lang="en-US" dirty="0"/>
-              <a:t>a concurrent allocator reclaims memory freed by the </a:t>
-            </a:r>
-            <a:r>
-              <a:rPr lang="en-US" dirty="0" smtClean="0"/>
-              <a:t>program </a:t>
-            </a:r>
-            <a:r>
-              <a:rPr lang="en-US" dirty="0"/>
-              <a:t>but fails to use it to satisfy future memory requests. </a:t>
+              <a:t>blowup is the increase in memory consumption caused when a concurrent allocator reclaims memory freed by the program but fails to use it to satisfy future memory requests. </a:t>
             </a:r>
           </a:p>
           <a:p>
             <a:pPr lvl="1"/>
-            <a:endParaRPr lang="en-US" dirty="0" smtClean="0"/>
-          </a:p>
-          <a:p>
             <a:endParaRPr lang="en-US" dirty="0"/>
           </a:p>
           <a:p>
-            <a:r>
-              <a:rPr lang="en-US" dirty="0" smtClean="0"/>
+            <a:endParaRPr lang="en-US" dirty="0"/>
+          </a:p>
+          <a:p>
+            <a:r>
+              <a:rPr lang="en-US" dirty="0"/>
               <a:t>Alignment Overhead (internal fragmentation)</a:t>
             </a:r>
           </a:p>
           <a:p>
             <a:pPr lvl="1"/>
             <a:r>
-              <a:rPr lang="en-US" dirty="0" smtClean="0"/>
+              <a:rPr lang="en-US" dirty="0"/>
               <a:t>How much memory are wasted due to the alignment (power-of-two or other methods)</a:t>
             </a:r>
           </a:p>
@@ -4369,14 +6651,14 @@
             <a:pPr marL="57150" indent="0">
               <a:buNone/>
             </a:pPr>
-            <a:endParaRPr lang="en-US" dirty="0" smtClean="0"/>
-          </a:p>
-          <a:p>
             <a:endParaRPr lang="en-US" dirty="0"/>
           </a:p>
           <a:p>
-            <a:r>
-              <a:rPr lang="en-US" dirty="0" smtClean="0"/>
+            <a:endParaRPr lang="en-US" dirty="0"/>
+          </a:p>
+          <a:p>
+            <a:r>
+              <a:rPr lang="en-US" dirty="0"/>
               <a:t>Total memory overhead (percentage)</a:t>
             </a:r>
           </a:p>
@@ -4385,10 +6667,9 @@
           </a:p>
           <a:p>
             <a:r>
-              <a:rPr lang="en-US" dirty="0" smtClean="0"/>
+              <a:rPr lang="en-US" dirty="0"/>
               <a:t>Total Memory Consumption (summary of active objects)</a:t>
             </a:r>
-            <a:endParaRPr lang="en-US" dirty="0"/>
           </a:p>
         </p:txBody>
       </p:sp>
@@ -4402,13 +6683,6 @@
   <p:clrMapOvr>
     <a:masterClrMapping/>
   </p:clrMapOvr>
-  <p:timing>
-    <p:tnLst>
-      <p:par>
-        <p:cTn xmlns:p14="http://schemas.microsoft.com/office/powerpoint/2010/main" id="1" dur="indefinite" restart="never" nodeType="tmRoot"/>
-      </p:par>
-    </p:tnLst>
-  </p:timing>
 </p:sld>
 </file>
 
@@ -4447,10 +6721,9 @@
           <a:lstStyle/>
           <a:p>
             <a:r>
-              <a:rPr lang="en-US" sz="3600" dirty="0" smtClean="0"/>
+              <a:rPr lang="en-US" sz="3600" dirty="0"/>
               <a:t>Memory Overhead for Each Size Class</a:t>
             </a:r>
-            <a:endParaRPr lang="en-US" sz="3600" dirty="0"/>
           </a:p>
         </p:txBody>
       </p:sp>
@@ -4477,7 +6750,7 @@
           <a:lstStyle/>
           <a:p>
             <a:r>
-              <a:rPr lang="en-US" dirty="0" smtClean="0"/>
+              <a:rPr lang="en-US" dirty="0"/>
               <a:t>Metadata Overhead</a:t>
             </a:r>
           </a:p>
@@ -4486,7 +6759,7 @@
           </a:p>
           <a:p>
             <a:r>
-              <a:rPr lang="en-US" dirty="0" smtClean="0"/>
+              <a:rPr lang="en-US" dirty="0"/>
               <a:t>Memory Blowup</a:t>
             </a:r>
           </a:p>
@@ -4495,7 +6768,7 @@
           </a:p>
           <a:p>
             <a:r>
-              <a:rPr lang="en-US" dirty="0" smtClean="0"/>
+              <a:rPr lang="en-US" dirty="0"/>
               <a:t>Alignment Overhead (internal fragmentation)</a:t>
             </a:r>
           </a:p>
@@ -4503,7 +6776,7 @@
             <a:pPr marL="457200" lvl="1" indent="0">
               <a:buNone/>
             </a:pPr>
-            <a:endParaRPr lang="en-US" dirty="0" smtClean="0"/>
+            <a:endParaRPr lang="en-US" dirty="0"/>
           </a:p>
           <a:p>
             <a:pPr marL="0" indent="0">
@@ -4536,10 +6809,9 @@
           <a:lstStyle/>
           <a:p>
             <a:r>
-              <a:rPr lang="en-US" dirty="0" smtClean="0"/>
+              <a:rPr lang="en-US" dirty="0"/>
               <a:t>Necessary for us in the future. But we may not claim that in the paper.</a:t>
             </a:r>
-            <a:endParaRPr lang="en-US" dirty="0"/>
           </a:p>
         </p:txBody>
       </p:sp>
@@ -4553,13 +6825,6 @@
   <p:clrMapOvr>
     <a:masterClrMapping/>
   </p:clrMapOvr>
-  <p:timing>
-    <p:tnLst>
-      <p:par>
-        <p:cTn xmlns:p14="http://schemas.microsoft.com/office/powerpoint/2010/main" id="1" dur="indefinite" restart="never" nodeType="tmRoot"/>
-      </p:par>
-    </p:tnLst>
-  </p:timing>
 </p:sld>
 </file>
 
@@ -4596,10 +6861,9 @@
           <a:lstStyle/>
           <a:p>
             <a:r>
-              <a:rPr lang="en-US" dirty="0" smtClean="0"/>
+              <a:rPr lang="en-US" dirty="0"/>
               <a:t>Evaluating Memory Blowup</a:t>
             </a:r>
-            <a:endParaRPr lang="en-US" dirty="0"/>
           </a:p>
         </p:txBody>
       </p:sp>
@@ -4619,16 +6883,15 @@
           <a:lstStyle/>
           <a:p>
             <a:r>
-              <a:rPr lang="en-US" dirty="0" smtClean="0"/>
+              <a:rPr lang="en-US" dirty="0"/>
               <a:t>We will compute the physical memory consumption, and actual physical memory consumption </a:t>
             </a:r>
           </a:p>
           <a:p>
             <a:r>
-              <a:rPr lang="en-US" dirty="0" smtClean="0"/>
+              <a:rPr lang="en-US" dirty="0"/>
               <a:t>Seeing Hoard’s paper on this</a:t>
             </a:r>
-            <a:endParaRPr lang="en-US" dirty="0"/>
           </a:p>
         </p:txBody>
       </p:sp>
@@ -4642,13 +6905,6 @@
   <p:clrMapOvr>
     <a:masterClrMapping/>
   </p:clrMapOvr>
-  <p:timing>
-    <p:tnLst>
-      <p:par>
-        <p:cTn xmlns:p14="http://schemas.microsoft.com/office/powerpoint/2010/main" id="1" dur="indefinite" restart="never" nodeType="tmRoot"/>
-      </p:par>
-    </p:tnLst>
-  </p:timing>
 </p:sld>
 </file>
 
@@ -4685,10 +6941,9 @@
           <a:lstStyle/>
           <a:p>
             <a:r>
-              <a:rPr lang="en-US" dirty="0" smtClean="0"/>
+              <a:rPr lang="en-US" dirty="0"/>
               <a:t>Scalability – Software Contention</a:t>
             </a:r>
-            <a:endParaRPr lang="en-US" dirty="0"/>
           </a:p>
         </p:txBody>
       </p:sp>
@@ -4710,7 +6965,7 @@
           <a:lstStyle/>
           <a:p>
             <a:r>
-              <a:rPr lang="en-US" dirty="0" smtClean="0"/>
+              <a:rPr lang="en-US" dirty="0"/>
               <a:t>User space contention</a:t>
             </a:r>
           </a:p>
@@ -4727,48 +6982,27 @@
               <a:rPr lang="en-US" dirty="0"/>
               <a:t>How many lock acquisitions? </a:t>
             </a:r>
-            <a:endParaRPr lang="en-US" dirty="0" smtClean="0"/>
           </a:p>
           <a:p>
             <a:pPr lvl="1"/>
             <a:r>
-              <a:rPr lang="en-US" dirty="0" smtClean="0"/>
-              <a:t>How </a:t>
-            </a:r>
-            <a:r>
-              <a:rPr lang="en-US" dirty="0"/>
-              <a:t>much </a:t>
-            </a:r>
-            <a:r>
-              <a:rPr lang="en-US" dirty="0" smtClean="0"/>
-              <a:t>percentage of time </a:t>
-            </a:r>
-            <a:r>
-              <a:rPr lang="en-US" dirty="0"/>
-              <a:t>are spending on lock waiting for each thread, and in total</a:t>
-            </a:r>
-            <a:r>
-              <a:rPr lang="en-US" dirty="0" smtClean="0"/>
-              <a:t>? (we could profile the average of </a:t>
-            </a:r>
-            <a:r>
-              <a:rPr lang="en-US" dirty="0" err="1" smtClean="0"/>
+              <a:rPr lang="en-US" dirty="0"/>
+              <a:t>How much percentage of time are spending on lock waiting for each thread, and in total? (we could profile the average of </a:t>
+            </a:r>
+            <a:r>
+              <a:rPr lang="en-US" dirty="0" err="1"/>
               <a:t>malloc</a:t>
             </a:r>
             <a:r>
               <a:rPr lang="en-US" dirty="0"/>
-              <a:t> </a:t>
-            </a:r>
-            <a:r>
-              <a:rPr lang="en-US" dirty="0" smtClean="0"/>
-              <a:t>without conflicts, or we could borrow </a:t>
-            </a:r>
-            <a:r>
-              <a:rPr lang="en-US" dirty="0" err="1" smtClean="0"/>
+              <a:t> without conflicts, or we could borrow </a:t>
+            </a:r>
+            <a:r>
+              <a:rPr lang="en-US" dirty="0" err="1"/>
               <a:t>SyncPerf</a:t>
             </a:r>
             <a:r>
-              <a:rPr lang="en-US" dirty="0" smtClean="0"/>
+              <a:rPr lang="en-US" dirty="0"/>
               <a:t>)</a:t>
             </a:r>
           </a:p>
@@ -4779,61 +7013,14 @@
           <a:p>
             <a:r>
               <a:rPr lang="en-US" dirty="0"/>
-              <a:t>Kernel space </a:t>
-            </a:r>
-            <a:r>
-              <a:rPr lang="en-US" dirty="0" smtClean="0"/>
-              <a:t>contention</a:t>
+              <a:t>Kernel space contention</a:t>
             </a:r>
           </a:p>
           <a:p>
             <a:pPr lvl="1"/>
             <a:r>
-              <a:rPr lang="en-US" dirty="0" smtClean="0"/>
+              <a:rPr lang="en-US" dirty="0"/>
               <a:t>How many times for each system call, such as </a:t>
-            </a:r>
-            <a:r>
-              <a:rPr lang="en-US" dirty="0" err="1" smtClean="0"/>
-              <a:t>mmap</a:t>
-            </a:r>
-            <a:r>
-              <a:rPr lang="en-US" dirty="0" smtClean="0"/>
-              <a:t>, </a:t>
-            </a:r>
-            <a:r>
-              <a:rPr lang="en-US" dirty="0" err="1" smtClean="0"/>
-              <a:t>munmap</a:t>
-            </a:r>
-            <a:r>
-              <a:rPr lang="en-US" dirty="0" smtClean="0"/>
-              <a:t>, </a:t>
-            </a:r>
-            <a:r>
-              <a:rPr lang="en-US" dirty="0" err="1" smtClean="0"/>
-              <a:t>madvise</a:t>
-            </a:r>
-            <a:r>
-              <a:rPr lang="en-US" dirty="0" smtClean="0"/>
-              <a:t>, </a:t>
-            </a:r>
-            <a:r>
-              <a:rPr lang="en-US" dirty="0" err="1" smtClean="0"/>
-              <a:t>brk</a:t>
-            </a:r>
-            <a:r>
-              <a:rPr lang="en-US" dirty="0"/>
-              <a:t>?</a:t>
-            </a:r>
-          </a:p>
-          <a:p>
-            <a:pPr lvl="1"/>
-            <a:r>
-              <a:rPr lang="en-US" dirty="0" smtClean="0"/>
-              <a:t>How </a:t>
-            </a:r>
-            <a:r>
-              <a:rPr lang="en-US" dirty="0"/>
-              <a:t>much time spending on kernel-space contention? For instance, we could infer from memory-related system calls, such as </a:t>
             </a:r>
             <a:r>
               <a:rPr lang="en-US" dirty="0" err="1"/>
@@ -4865,11 +7052,50 @@
             </a:r>
             <a:r>
               <a:rPr lang="en-US" dirty="0"/>
+              <a:t>?</a:t>
+            </a:r>
+          </a:p>
+          <a:p>
+            <a:pPr lvl="1"/>
+            <a:r>
+              <a:rPr lang="en-US" dirty="0"/>
+              <a:t>How much time spending on kernel-space contention? For instance, we could infer from memory-related system calls, such as </a:t>
+            </a:r>
+            <a:r>
+              <a:rPr lang="en-US" dirty="0" err="1"/>
+              <a:t>mmap</a:t>
+            </a:r>
+            <a:r>
+              <a:rPr lang="en-US" dirty="0"/>
+              <a:t>, </a:t>
+            </a:r>
+            <a:r>
+              <a:rPr lang="en-US" dirty="0" err="1"/>
+              <a:t>munmap</a:t>
+            </a:r>
+            <a:r>
+              <a:rPr lang="en-US" dirty="0"/>
+              <a:t>, </a:t>
+            </a:r>
+            <a:r>
+              <a:rPr lang="en-US" dirty="0" err="1"/>
+              <a:t>madvise</a:t>
+            </a:r>
+            <a:r>
+              <a:rPr lang="en-US" dirty="0"/>
+              <a:t>, </a:t>
+            </a:r>
+            <a:r>
+              <a:rPr lang="en-US" dirty="0" err="1"/>
+              <a:t>brk</a:t>
+            </a:r>
+            <a:r>
+              <a:rPr lang="en-US" dirty="0"/>
               <a:t>, or something else?</a:t>
             </a:r>
           </a:p>
           <a:p>
-            <a:endParaRPr lang="en-US" dirty="0" smtClean="0"/>
+            <a:endParaRPr lang="en-US" dirty="0"/>
           </a:p>
         </p:txBody>
       </p:sp>
@@ -4883,13 +7109,6 @@
   <p:clrMapOvr>
     <a:masterClrMapping/>
   </p:clrMapOvr>
-  <p:timing>
-    <p:tnLst>
-      <p:par>
-        <p:cTn xmlns:p14="http://schemas.microsoft.com/office/powerpoint/2010/main" id="1" dur="indefinite" restart="never" nodeType="tmRoot"/>
-      </p:par>
-    </p:tnLst>
-  </p:timing>
 </p:sld>
 </file>
 
@@ -4926,10 +7145,9 @@
           <a:lstStyle/>
           <a:p>
             <a:r>
-              <a:rPr lang="en-US" dirty="0" smtClean="0"/>
+              <a:rPr lang="en-US" dirty="0"/>
               <a:t>Application Friendliness</a:t>
             </a:r>
-            <a:endParaRPr lang="en-US" dirty="0"/>
           </a:p>
         </p:txBody>
       </p:sp>
@@ -4956,21 +7174,21 @@
           <a:lstStyle/>
           <a:p>
             <a:r>
-              <a:rPr lang="en-US" dirty="0" smtClean="0"/>
+              <a:rPr lang="en-US" dirty="0"/>
               <a:t>Cache Friendliness</a:t>
             </a:r>
           </a:p>
           <a:p>
             <a:pPr lvl="1"/>
             <a:r>
-              <a:rPr lang="en-US" dirty="0" smtClean="0"/>
+              <a:rPr lang="en-US" dirty="0"/>
               <a:t>How much is metadata (cache waste)</a:t>
             </a:r>
           </a:p>
           <a:p>
             <a:pPr lvl="1"/>
             <a:r>
-              <a:rPr lang="en-US" dirty="0" smtClean="0"/>
+              <a:rPr lang="en-US" dirty="0"/>
               <a:t>Cache misses</a:t>
             </a:r>
           </a:p>
@@ -4978,11 +7196,11 @@
             <a:pPr marL="457200" lvl="1" indent="0">
               <a:buNone/>
             </a:pPr>
-            <a:endParaRPr lang="en-US" dirty="0" smtClean="0"/>
-          </a:p>
-          <a:p>
-            <a:r>
-              <a:rPr lang="en-US" dirty="0" smtClean="0"/>
+            <a:endParaRPr lang="en-US" dirty="0"/>
+          </a:p>
+          <a:p>
+            <a:r>
+              <a:rPr lang="en-US" dirty="0"/>
               <a:t>NUMA Friendliness</a:t>
             </a:r>
           </a:p>
@@ -4990,40 +7208,27 @@
             <a:pPr lvl="1"/>
             <a:r>
               <a:rPr lang="en-US" dirty="0"/>
-              <a:t>Remote </a:t>
-            </a:r>
-            <a:r>
-              <a:rPr lang="en-US" dirty="0" smtClean="0"/>
-              <a:t>accesses</a:t>
-            </a:r>
-            <a:endParaRPr lang="en-US" dirty="0"/>
+              <a:t>Remote accesses</a:t>
+            </a:r>
           </a:p>
           <a:p>
             <a:pPr lvl="1"/>
             <a:r>
               <a:rPr lang="en-US" dirty="0"/>
-              <a:t>Interconnect </a:t>
-            </a:r>
-            <a:r>
-              <a:rPr lang="en-US" dirty="0" smtClean="0"/>
-              <a:t>Contention</a:t>
+              <a:t>Interconnect Contention</a:t>
             </a:r>
           </a:p>
           <a:p>
             <a:pPr marL="57150" indent="0">
               <a:buNone/>
             </a:pPr>
-            <a:endParaRPr lang="en-US" dirty="0" smtClean="0"/>
+            <a:endParaRPr lang="en-US" dirty="0"/>
           </a:p>
           <a:p>
             <a:pPr marL="514350" indent="-457200"/>
             <a:r>
-              <a:rPr lang="en-US" dirty="0" smtClean="0"/>
-              <a:t>TLB/Page </a:t>
-            </a:r>
-            <a:r>
-              <a:rPr lang="en-US" dirty="0" smtClean="0"/>
-              <a:t>Friendliness</a:t>
+              <a:rPr lang="en-US" dirty="0"/>
+              <a:t>TLB/Page Friendliness</a:t>
             </a:r>
           </a:p>
           <a:p>
@@ -5042,13 +7247,6 @@
   <p:clrMapOvr>
     <a:masterClrMapping/>
   </p:clrMapOvr>
-  <p:timing>
-    <p:tnLst>
-      <p:par>
-        <p:cTn xmlns:p14="http://schemas.microsoft.com/office/powerpoint/2010/main" id="1" dur="indefinite" restart="never" nodeType="tmRoot"/>
-      </p:par>
-    </p:tnLst>
-  </p:timing>
 </p:sld>
 </file>
 
@@ -5085,10 +7283,9 @@
           <a:lstStyle/>
           <a:p>
             <a:r>
-              <a:rPr lang="en-US" dirty="0" smtClean="0"/>
+              <a:rPr lang="en-US" dirty="0"/>
               <a:t>NUMA (Page) Friendliness</a:t>
             </a:r>
-            <a:endParaRPr lang="en-US" dirty="0"/>
           </a:p>
         </p:txBody>
       </p:sp>
@@ -5110,47 +7307,42 @@
           <a:lstStyle/>
           <a:p>
             <a:r>
-              <a:rPr lang="en-US" dirty="0" smtClean="0"/>
+              <a:rPr lang="en-US" dirty="0"/>
               <a:t>Objects that changes the ownership (sizes) of threads due to multiple mechanisms</a:t>
             </a:r>
           </a:p>
           <a:p>
             <a:pPr lvl="1"/>
             <a:r>
-              <a:rPr lang="en-US" dirty="0" smtClean="0"/>
+              <a:rPr lang="en-US" dirty="0"/>
               <a:t>Freed by another thread, and then utilized by a different per-thread heap</a:t>
             </a:r>
           </a:p>
           <a:p>
             <a:pPr lvl="1"/>
             <a:r>
-              <a:rPr lang="en-US" dirty="0" smtClean="0"/>
+              <a:rPr lang="en-US" dirty="0"/>
               <a:t>Memory contributing to the global buffer to reduce memory blowup</a:t>
             </a:r>
           </a:p>
           <a:p>
             <a:r>
-              <a:rPr lang="en-US" dirty="0" smtClean="0"/>
+              <a:rPr lang="en-US" dirty="0"/>
               <a:t>Other factors</a:t>
             </a:r>
           </a:p>
           <a:p>
             <a:pPr lvl="1"/>
             <a:r>
-              <a:rPr lang="en-US" dirty="0" smtClean="0"/>
-              <a:t>Number of remote accesses (PMU</a:t>
-            </a:r>
-            <a:r>
-              <a:rPr lang="en-US" dirty="0" smtClean="0"/>
-              <a:t>)</a:t>
-            </a:r>
-          </a:p>
-          <a:p>
-            <a:r>
-              <a:rPr lang="en-US" dirty="0" smtClean="0"/>
+              <a:rPr lang="en-US" dirty="0"/>
+              <a:t>Number of remote accesses (PMU)</a:t>
+            </a:r>
+          </a:p>
+          <a:p>
+            <a:r>
+              <a:rPr lang="en-US" dirty="0"/>
               <a:t>We could utilize the number of changes as the factor. If the number is larger, then it is not friendly. </a:t>
             </a:r>
-            <a:endParaRPr lang="en-US" dirty="0" smtClean="0"/>
           </a:p>
           <a:p>
             <a:endParaRPr lang="en-US" dirty="0"/>
@@ -5170,13 +7362,6 @@
   <p:clrMapOvr>
     <a:masterClrMapping/>
   </p:clrMapOvr>
-  <p:timing>
-    <p:tnLst>
-      <p:par>
-        <p:cTn xmlns:p14="http://schemas.microsoft.com/office/powerpoint/2010/main" id="1" dur="indefinite" restart="never" nodeType="tmRoot"/>
-      </p:par>
-    </p:tnLst>
-  </p:timing>
 </p:sld>
 </file>
 

</xml_diff>